<commit_message>
Updated plant generation; Updated presentation
</commit_message>
<xml_diff>
--- a/Prezentare/OceanExploration.pptx
+++ b/Prezentare/OceanExploration.pptx
@@ -5,10 +5,10 @@
     <p:sldMasterId id="2147483744" r:id="rId4"/>
   </p:sldMasterIdLst>
   <p:notesMasterIdLst>
-    <p:notesMasterId r:id="rId12"/>
+    <p:notesMasterId r:id="rId16"/>
   </p:notesMasterIdLst>
   <p:handoutMasterIdLst>
-    <p:handoutMasterId r:id="rId13"/>
+    <p:handoutMasterId r:id="rId17"/>
   </p:handoutMasterIdLst>
   <p:sldIdLst>
     <p:sldId id="256" r:id="rId5"/>
@@ -16,8 +16,12 @@
     <p:sldId id="258" r:id="rId7"/>
     <p:sldId id="260" r:id="rId8"/>
     <p:sldId id="275" r:id="rId9"/>
-    <p:sldId id="264" r:id="rId10"/>
-    <p:sldId id="274" r:id="rId11"/>
+    <p:sldId id="277" r:id="rId10"/>
+    <p:sldId id="278" r:id="rId11"/>
+    <p:sldId id="279" r:id="rId12"/>
+    <p:sldId id="280" r:id="rId13"/>
+    <p:sldId id="264" r:id="rId14"/>
+    <p:sldId id="274" r:id="rId15"/>
   </p:sldIdLst>
   <p:sldSz cx="12192000" cy="6858000"/>
   <p:notesSz cx="6858000" cy="9144000"/>
@@ -232,7 +236,7 @@
           <a:p>
             <a:fld id="{866D81A9-CFC2-4640-899E-DD3E177BE50A}" type="datetimeFigureOut">
               <a:rPr lang="en-US" smtClean="0"/>
-              <a:t>4/11/2022</a:t>
+              <a:t>4/12/2022</a:t>
             </a:fld>
             <a:endParaRPr lang="en-US" dirty="0"/>
           </a:p>
@@ -409,7 +413,7 @@
           <a:p>
             <a:fld id="{AA1E50F4-C55A-473A-A70B-4B042EF011A9}" type="datetimeFigureOut">
               <a:rPr lang="en-US" smtClean="0"/>
-              <a:t>4/11/2022</a:t>
+              <a:t>4/12/2022</a:t>
             </a:fld>
             <a:endParaRPr lang="en-US" dirty="0"/>
           </a:p>
@@ -993,7 +997,7 @@
           <a:p>
             <a:fld id="{F3544625-0ADF-4414-89A2-9E135F0C849F}" type="slidenum">
               <a:rPr lang="en-US" smtClean="0"/>
-              <a:t>6</a:t>
+              <a:t>10</a:t>
             </a:fld>
             <a:endParaRPr lang="en-US" dirty="0"/>
           </a:p>
@@ -1077,7 +1081,7 @@
           <a:p>
             <a:fld id="{F3544625-0ADF-4414-89A2-9E135F0C849F}" type="slidenum">
               <a:rPr lang="en-US" smtClean="0"/>
-              <a:t>7</a:t>
+              <a:t>11</a:t>
             </a:fld>
             <a:endParaRPr lang="en-US" dirty="0"/>
           </a:p>
@@ -1326,7 +1330,7 @@
             <a:fld id="{87DE6118-2437-4B30-8E3C-4D2BE6020583}" type="datetimeFigureOut">
               <a:rPr lang="en-US" smtClean="0"/>
               <a:pPr/>
-              <a:t>4/11/2022</a:t>
+              <a:t>4/12/2022</a:t>
             </a:fld>
             <a:endParaRPr lang="en-US" dirty="0"/>
           </a:p>
@@ -1662,7 +1666,7 @@
             <a:fld id="{87DE6118-2437-4B30-8E3C-4D2BE6020583}" type="datetimeFigureOut">
               <a:rPr lang="en-US" smtClean="0"/>
               <a:pPr/>
-              <a:t>4/11/2022</a:t>
+              <a:t>4/12/2022</a:t>
             </a:fld>
             <a:endParaRPr lang="en-US" dirty="0"/>
           </a:p>
@@ -1942,7 +1946,7 @@
             <a:fld id="{87DE6118-2437-4B30-8E3C-4D2BE6020583}" type="datetimeFigureOut">
               <a:rPr lang="en-US" smtClean="0"/>
               <a:pPr/>
-              <a:t>4/11/2022</a:t>
+              <a:t>4/12/2022</a:t>
             </a:fld>
             <a:endParaRPr lang="en-US" dirty="0"/>
           </a:p>
@@ -2512,7 +2516,7 @@
             <a:fld id="{87DE6118-2437-4B30-8E3C-4D2BE6020583}" type="datetimeFigureOut">
               <a:rPr lang="en-US" smtClean="0"/>
               <a:pPr/>
-              <a:t>4/11/2022</a:t>
+              <a:t>4/12/2022</a:t>
             </a:fld>
             <a:endParaRPr lang="en-US" dirty="0"/>
           </a:p>
@@ -2792,7 +2796,7 @@
             <a:fld id="{87DE6118-2437-4B30-8E3C-4D2BE6020583}" type="datetimeFigureOut">
               <a:rPr lang="en-US" smtClean="0"/>
               <a:pPr/>
-              <a:t>4/11/2022</a:t>
+              <a:t>4/12/2022</a:t>
             </a:fld>
             <a:endParaRPr lang="en-US" dirty="0"/>
           </a:p>
@@ -3356,7 +3360,7 @@
             <a:fld id="{87DE6118-2437-4B30-8E3C-4D2BE6020583}" type="datetimeFigureOut">
               <a:rPr lang="en-US" smtClean="0"/>
               <a:pPr/>
-              <a:t>4/11/2022</a:t>
+              <a:t>4/12/2022</a:t>
             </a:fld>
             <a:endParaRPr lang="en-US" dirty="0"/>
           </a:p>
@@ -3685,7 +3689,7 @@
             <a:fld id="{87DE6118-2437-4B30-8E3C-4D2BE6020583}" type="datetimeFigureOut">
               <a:rPr lang="en-US" smtClean="0"/>
               <a:pPr/>
-              <a:t>4/11/2022</a:t>
+              <a:t>4/12/2022</a:t>
             </a:fld>
             <a:endParaRPr lang="en-US" dirty="0"/>
           </a:p>
@@ -3891,7 +3895,7 @@
           <a:p>
             <a:fld id="{87DE6118-2437-4B30-8E3C-4D2BE6020583}" type="datetimeFigureOut">
               <a:rPr lang="en-US" smtClean="0"/>
-              <a:t>4/11/2022</a:t>
+              <a:t>4/12/2022</a:t>
             </a:fld>
             <a:endParaRPr lang="en-US" dirty="0"/>
           </a:p>
@@ -4101,7 +4105,7 @@
           <a:p>
             <a:fld id="{87DE6118-2437-4B30-8E3C-4D2BE6020583}" type="datetimeFigureOut">
               <a:rPr lang="en-US" smtClean="0"/>
-              <a:t>4/11/2022</a:t>
+              <a:t>4/12/2022</a:t>
             </a:fld>
             <a:endParaRPr lang="en-US" dirty="0"/>
           </a:p>
@@ -4301,7 +4305,7 @@
           <a:p>
             <a:fld id="{87DE6118-2437-4B30-8E3C-4D2BE6020583}" type="datetimeFigureOut">
               <a:rPr lang="en-US" smtClean="0"/>
-              <a:t>4/11/2022</a:t>
+              <a:t>4/12/2022</a:t>
             </a:fld>
             <a:endParaRPr lang="en-US" dirty="0"/>
           </a:p>
@@ -4578,7 +4582,7 @@
             <a:fld id="{87DE6118-2437-4B30-8E3C-4D2BE6020583}" type="datetimeFigureOut">
               <a:rPr lang="en-US" smtClean="0"/>
               <a:pPr/>
-              <a:t>4/11/2022</a:t>
+              <a:t>4/12/2022</a:t>
             </a:fld>
             <a:endParaRPr lang="en-US" dirty="0"/>
           </a:p>
@@ -4845,7 +4849,7 @@
           <a:p>
             <a:fld id="{87DE6118-2437-4B30-8E3C-4D2BE6020583}" type="datetimeFigureOut">
               <a:rPr lang="en-US" smtClean="0"/>
-              <a:t>4/11/2022</a:t>
+              <a:t>4/12/2022</a:t>
             </a:fld>
             <a:endParaRPr lang="en-US" dirty="0"/>
           </a:p>
@@ -5219,7 +5223,7 @@
           <a:p>
             <a:fld id="{87DE6118-2437-4B30-8E3C-4D2BE6020583}" type="datetimeFigureOut">
               <a:rPr lang="en-US" smtClean="0"/>
-              <a:t>4/11/2022</a:t>
+              <a:t>4/12/2022</a:t>
             </a:fld>
             <a:endParaRPr lang="en-US" dirty="0"/>
           </a:p>
@@ -5367,7 +5371,7 @@
           <a:p>
             <a:fld id="{87DE6118-2437-4B30-8E3C-4D2BE6020583}" type="datetimeFigureOut">
               <a:rPr lang="en-US" smtClean="0"/>
-              <a:t>4/11/2022</a:t>
+              <a:t>4/12/2022</a:t>
             </a:fld>
             <a:endParaRPr lang="en-US" dirty="0"/>
           </a:p>
@@ -5492,7 +5496,7 @@
           <a:p>
             <a:fld id="{87DE6118-2437-4B30-8E3C-4D2BE6020583}" type="datetimeFigureOut">
               <a:rPr lang="en-US" smtClean="0"/>
-              <a:t>4/11/2022</a:t>
+              <a:t>4/12/2022</a:t>
             </a:fld>
             <a:endParaRPr lang="en-US" dirty="0"/>
           </a:p>
@@ -5778,7 +5782,7 @@
             <a:fld id="{87DE6118-2437-4B30-8E3C-4D2BE6020583}" type="datetimeFigureOut">
               <a:rPr lang="en-US" smtClean="0"/>
               <a:pPr/>
-              <a:t>4/11/2022</a:t>
+              <a:t>4/12/2022</a:t>
             </a:fld>
             <a:endParaRPr lang="en-US" dirty="0"/>
           </a:p>
@@ -6104,7 +6108,7 @@
             <a:fld id="{87DE6118-2437-4B30-8E3C-4D2BE6020583}" type="datetimeFigureOut">
               <a:rPr lang="en-US" smtClean="0"/>
               <a:pPr/>
-              <a:t>4/11/2022</a:t>
+              <a:t>4/12/2022</a:t>
             </a:fld>
             <a:endParaRPr lang="en-US" dirty="0"/>
           </a:p>
@@ -6320,7 +6324,7 @@
             <a:fld id="{87DE6118-2437-4B30-8E3C-4D2BE6020583}" type="datetimeFigureOut">
               <a:rPr lang="en-US" smtClean="0"/>
               <a:pPr/>
-              <a:t>4/11/2022</a:t>
+              <a:t>4/12/2022</a:t>
             </a:fld>
             <a:endParaRPr lang="en-US" dirty="0"/>
           </a:p>
@@ -7399,6 +7403,439 @@
 </p:sld>
 </file>
 
+<file path=ppt/slides/slide10.xml><?xml version="1.0" encoding="utf-8"?>
+<p:sld xmlns:a="http://schemas.openxmlformats.org/drawingml/2006/main" xmlns:r="http://schemas.openxmlformats.org/officeDocument/2006/relationships" xmlns:p="http://schemas.openxmlformats.org/presentationml/2006/main">
+  <p:cSld>
+    <p:spTree>
+      <p:nvGrpSpPr>
+        <p:cNvPr id="1" name=""/>
+        <p:cNvGrpSpPr/>
+        <p:nvPr/>
+      </p:nvGrpSpPr>
+      <p:grpSpPr>
+        <a:xfrm>
+          <a:off x="0" y="0"/>
+          <a:ext cx="0" cy="0"/>
+          <a:chOff x="0" y="0"/>
+          <a:chExt cx="0" cy="0"/>
+        </a:xfrm>
+      </p:grpSpPr>
+      <p:pic>
+        <p:nvPicPr>
+          <p:cNvPr id="4" name="Content Placeholder 3" descr="night sky with mountains on the horizon">
+            <a:extLst>
+              <a:ext uri="{FF2B5EF4-FFF2-40B4-BE49-F238E27FC236}">
+                <a16:creationId xmlns:a16="http://schemas.microsoft.com/office/drawing/2014/main" id="{2739CFE1-3E46-48B5-9BDB-769492BA7A53}"/>
+              </a:ext>
+            </a:extLst>
+          </p:cNvPr>
+          <p:cNvPicPr>
+            <a:picLocks noGrp="1" noChangeAspect="1"/>
+          </p:cNvPicPr>
+          <p:nvPr>
+            <p:ph sz="half" idx="1"/>
+          </p:nvPr>
+        </p:nvPicPr>
+        <p:blipFill rotWithShape="1">
+          <a:blip r:embed="rId3"/>
+          <a:srcRect t="4555" b="4555"/>
+          <a:stretch/>
+        </p:blipFill>
+        <p:spPr>
+          <a:xfrm>
+            <a:off x="-600" y="-1226"/>
+            <a:ext cx="12193200" cy="6860452"/>
+          </a:xfrm>
+          <a:custGeom>
+            <a:avLst/>
+            <a:gdLst/>
+            <a:ahLst/>
+            <a:cxnLst/>
+            <a:rect l="l" t="t" r="r" b="b"/>
+            <a:pathLst>
+              <a:path w="12192000" h="6858000">
+                <a:moveTo>
+                  <a:pt x="6090347" y="706999"/>
+                </a:moveTo>
+                <a:cubicBezTo>
+                  <a:pt x="4588386" y="706999"/>
+                  <a:pt x="3370806" y="1924579"/>
+                  <a:pt x="3370806" y="3426541"/>
+                </a:cubicBezTo>
+                <a:cubicBezTo>
+                  <a:pt x="3370806" y="4928503"/>
+                  <a:pt x="4588386" y="6146083"/>
+                  <a:pt x="6090347" y="6146083"/>
+                </a:cubicBezTo>
+                <a:cubicBezTo>
+                  <a:pt x="7592308" y="6146083"/>
+                  <a:pt x="8809888" y="4928503"/>
+                  <a:pt x="8809888" y="3426541"/>
+                </a:cubicBezTo>
+                <a:cubicBezTo>
+                  <a:pt x="8809888" y="1924579"/>
+                  <a:pt x="7592308" y="706999"/>
+                  <a:pt x="6090347" y="706999"/>
+                </a:cubicBezTo>
+                <a:close/>
+                <a:moveTo>
+                  <a:pt x="6082303" y="247854"/>
+                </a:moveTo>
+                <a:cubicBezTo>
+                  <a:pt x="7836802" y="247854"/>
+                  <a:pt x="9259104" y="1671227"/>
+                  <a:pt x="9259104" y="3427045"/>
+                </a:cubicBezTo>
+                <a:cubicBezTo>
+                  <a:pt x="9259104" y="5182864"/>
+                  <a:pt x="7836802" y="6606237"/>
+                  <a:pt x="6082303" y="6606237"/>
+                </a:cubicBezTo>
+                <a:cubicBezTo>
+                  <a:pt x="4327804" y="6606237"/>
+                  <a:pt x="2905502" y="5182864"/>
+                  <a:pt x="2905502" y="3427045"/>
+                </a:cubicBezTo>
+                <a:cubicBezTo>
+                  <a:pt x="2905502" y="1671227"/>
+                  <a:pt x="4327804" y="247854"/>
+                  <a:pt x="6082303" y="247854"/>
+                </a:cubicBezTo>
+                <a:close/>
+                <a:moveTo>
+                  <a:pt x="9560257" y="0"/>
+                </a:moveTo>
+                <a:lnTo>
+                  <a:pt x="12192000" y="0"/>
+                </a:lnTo>
+                <a:lnTo>
+                  <a:pt x="12192000" y="6858000"/>
+                </a:lnTo>
+                <a:lnTo>
+                  <a:pt x="9560255" y="6858000"/>
+                </a:lnTo>
+                <a:lnTo>
+                  <a:pt x="9704262" y="6706843"/>
+                </a:lnTo>
+                <a:cubicBezTo>
+                  <a:pt x="10490530" y="5841105"/>
+                  <a:pt x="10969748" y="4691058"/>
+                  <a:pt x="10969748" y="3428999"/>
+                </a:cubicBezTo>
+                <a:cubicBezTo>
+                  <a:pt x="10969748" y="2166941"/>
+                  <a:pt x="10490530" y="1016894"/>
+                  <a:pt x="9704262" y="151155"/>
+                </a:cubicBezTo>
+                <a:close/>
+                <a:moveTo>
+                  <a:pt x="7947654" y="0"/>
+                </a:moveTo>
+                <a:lnTo>
+                  <a:pt x="8099035" y="0"/>
+                </a:lnTo>
+                <a:lnTo>
+                  <a:pt x="8158569" y="34257"/>
+                </a:lnTo>
+                <a:cubicBezTo>
+                  <a:pt x="9305381" y="731601"/>
+                  <a:pt x="10071441" y="1993601"/>
+                  <a:pt x="10071441" y="3434659"/>
+                </a:cubicBezTo>
+                <a:cubicBezTo>
+                  <a:pt x="10071441" y="4875717"/>
+                  <a:pt x="9305381" y="6137716"/>
+                  <a:pt x="8158569" y="6835060"/>
+                </a:cubicBezTo>
+                <a:lnTo>
+                  <a:pt x="8118703" y="6858000"/>
+                </a:lnTo>
+                <a:lnTo>
+                  <a:pt x="7923440" y="6858000"/>
+                </a:lnTo>
+                <a:lnTo>
+                  <a:pt x="7938929" y="6850061"/>
+                </a:lnTo>
+                <a:cubicBezTo>
+                  <a:pt x="9153123" y="6189975"/>
+                  <a:pt x="9977382" y="4902579"/>
+                  <a:pt x="9977382" y="3422520"/>
+                </a:cubicBezTo>
+                <a:cubicBezTo>
+                  <a:pt x="9977382" y="2009739"/>
+                  <a:pt x="9226353" y="772500"/>
+                  <a:pt x="8102044" y="88839"/>
+                </a:cubicBezTo>
+                <a:close/>
+                <a:moveTo>
+                  <a:pt x="4097777" y="0"/>
+                </a:moveTo>
+                <a:lnTo>
+                  <a:pt x="4216953" y="0"/>
+                </a:lnTo>
+                <a:lnTo>
+                  <a:pt x="4062563" y="88839"/>
+                </a:lnTo>
+                <a:cubicBezTo>
+                  <a:pt x="2938253" y="772500"/>
+                  <a:pt x="2187224" y="2009739"/>
+                  <a:pt x="2187224" y="3422520"/>
+                </a:cubicBezTo>
+                <a:cubicBezTo>
+                  <a:pt x="2187224" y="4902579"/>
+                  <a:pt x="3011483" y="6189975"/>
+                  <a:pt x="4225677" y="6850061"/>
+                </a:cubicBezTo>
+                <a:lnTo>
+                  <a:pt x="4241167" y="6858000"/>
+                </a:lnTo>
+                <a:lnTo>
+                  <a:pt x="4078110" y="6858000"/>
+                </a:lnTo>
+                <a:lnTo>
+                  <a:pt x="4038243" y="6835060"/>
+                </a:lnTo>
+                <a:cubicBezTo>
+                  <a:pt x="2891431" y="6137716"/>
+                  <a:pt x="2125371" y="4875717"/>
+                  <a:pt x="2125371" y="3434659"/>
+                </a:cubicBezTo>
+                <a:cubicBezTo>
+                  <a:pt x="2125371" y="1993601"/>
+                  <a:pt x="2891431" y="731601"/>
+                  <a:pt x="4038243" y="34257"/>
+                </a:cubicBezTo>
+                <a:close/>
+                <a:moveTo>
+                  <a:pt x="0" y="0"/>
+                </a:moveTo>
+                <a:lnTo>
+                  <a:pt x="2636555" y="0"/>
+                </a:lnTo>
+                <a:lnTo>
+                  <a:pt x="2492551" y="151155"/>
+                </a:lnTo>
+                <a:cubicBezTo>
+                  <a:pt x="1706282" y="1016894"/>
+                  <a:pt x="1227064" y="2166941"/>
+                  <a:pt x="1227064" y="3428999"/>
+                </a:cubicBezTo>
+                <a:cubicBezTo>
+                  <a:pt x="1227064" y="4691058"/>
+                  <a:pt x="1706282" y="5841105"/>
+                  <a:pt x="2492551" y="6706843"/>
+                </a:cubicBezTo>
+                <a:lnTo>
+                  <a:pt x="2636557" y="6858000"/>
+                </a:lnTo>
+                <a:lnTo>
+                  <a:pt x="0" y="6858000"/>
+                </a:lnTo>
+                <a:close/>
+              </a:path>
+            </a:pathLst>
+          </a:custGeom>
+          <a:ln w="60325" cmpd="dbl">
+            <a:solidFill>
+              <a:schemeClr val="tx1">
+                <a:alpha val="40000"/>
+              </a:schemeClr>
+            </a:solidFill>
+          </a:ln>
+        </p:spPr>
+      </p:pic>
+      <p:sp>
+        <p:nvSpPr>
+          <p:cNvPr id="2" name="Title 1">
+            <a:extLst>
+              <a:ext uri="{FF2B5EF4-FFF2-40B4-BE49-F238E27FC236}">
+                <a16:creationId xmlns:a16="http://schemas.microsoft.com/office/drawing/2014/main" id="{144E241E-3110-4B1C-B9B0-F17B90FEEC1D}"/>
+              </a:ext>
+            </a:extLst>
+          </p:cNvPr>
+          <p:cNvSpPr>
+            <a:spLocks noGrp="1"/>
+          </p:cNvSpPr>
+          <p:nvPr>
+            <p:ph type="title"/>
+          </p:nvPr>
+        </p:nvSpPr>
+        <p:spPr>
+          <a:xfrm>
+            <a:off x="2408903" y="787400"/>
+            <a:ext cx="7390680" cy="1278467"/>
+          </a:xfrm>
+        </p:spPr>
+        <p:txBody>
+          <a:bodyPr vert="horz" lIns="91440" tIns="45720" rIns="91440" bIns="45720" rtlCol="0" anchor="ctr">
+            <a:normAutofit/>
+          </a:bodyPr>
+          <a:lstStyle/>
+          <a:p>
+            <a:pPr algn="ctr"/>
+            <a:r>
+              <a:rPr lang="en-US" dirty="0"/>
+              <a:t>Network Technology</a:t>
+            </a:r>
+          </a:p>
+        </p:txBody>
+      </p:sp>
+    </p:spTree>
+    <p:extLst>
+      <p:ext uri="{BB962C8B-B14F-4D97-AF65-F5344CB8AC3E}">
+        <p14:creationId xmlns:p14="http://schemas.microsoft.com/office/powerpoint/2010/main" val="1974828406"/>
+      </p:ext>
+    </p:extLst>
+  </p:cSld>
+  <p:clrMapOvr>
+    <a:masterClrMapping/>
+  </p:clrMapOvr>
+</p:sld>
+</file>
+
+<file path=ppt/slides/slide11.xml><?xml version="1.0" encoding="utf-8"?>
+<p:sld xmlns:a="http://schemas.openxmlformats.org/drawingml/2006/main" xmlns:r="http://schemas.openxmlformats.org/officeDocument/2006/relationships" xmlns:p="http://schemas.openxmlformats.org/presentationml/2006/main">
+  <p:cSld>
+    <p:spTree>
+      <p:nvGrpSpPr>
+        <p:cNvPr id="1" name=""/>
+        <p:cNvGrpSpPr/>
+        <p:nvPr/>
+      </p:nvGrpSpPr>
+      <p:grpSpPr>
+        <a:xfrm>
+          <a:off x="0" y="0"/>
+          <a:ext cx="0" cy="0"/>
+          <a:chOff x="0" y="0"/>
+          <a:chExt cx="0" cy="0"/>
+        </a:xfrm>
+      </p:grpSpPr>
+      <p:pic>
+        <p:nvPicPr>
+          <p:cNvPr id="5" name="Picture 4" descr="light spots">
+            <a:extLst>
+              <a:ext uri="{FF2B5EF4-FFF2-40B4-BE49-F238E27FC236}">
+                <a16:creationId xmlns:a16="http://schemas.microsoft.com/office/drawing/2014/main" id="{20A520D0-11CF-4639-8537-F56A8A2FDCFD}"/>
+              </a:ext>
+            </a:extLst>
+          </p:cNvPr>
+          <p:cNvPicPr>
+            <a:picLocks noChangeAspect="1"/>
+          </p:cNvPicPr>
+          <p:nvPr/>
+        </p:nvPicPr>
+        <p:blipFill rotWithShape="1">
+          <a:blip r:embed="rId3">
+            <a:alphaModFix amt="20000"/>
+            <a:extLst>
+              <a:ext uri="{28A0092B-C50C-407E-A947-70E740481C1C}">
+                <a14:useLocalDpi xmlns:a14="http://schemas.microsoft.com/office/drawing/2010/main"/>
+              </a:ext>
+            </a:extLst>
+          </a:blip>
+          <a:srcRect/>
+          <a:stretch/>
+        </p:blipFill>
+        <p:spPr>
+          <a:xfrm>
+            <a:off x="20" y="10"/>
+            <a:ext cx="12191980" cy="6857990"/>
+          </a:xfrm>
+          <a:prstGeom prst="rect">
+            <a:avLst/>
+          </a:prstGeom>
+        </p:spPr>
+      </p:pic>
+      <p:sp>
+        <p:nvSpPr>
+          <p:cNvPr id="2" name="Title 1">
+            <a:extLst>
+              <a:ext uri="{FF2B5EF4-FFF2-40B4-BE49-F238E27FC236}">
+                <a16:creationId xmlns:a16="http://schemas.microsoft.com/office/drawing/2014/main" id="{D44BCB7C-A6FC-4118-9027-468ECFDE6455}"/>
+              </a:ext>
+            </a:extLst>
+          </p:cNvPr>
+          <p:cNvSpPr>
+            <a:spLocks noGrp="1"/>
+          </p:cNvSpPr>
+          <p:nvPr>
+            <p:ph type="ctrTitle"/>
+          </p:nvPr>
+        </p:nvSpPr>
+        <p:spPr>
+          <a:xfrm>
+            <a:off x="3962399" y="2573867"/>
+            <a:ext cx="7197726" cy="2421464"/>
+          </a:xfrm>
+        </p:spPr>
+        <p:txBody>
+          <a:bodyPr>
+            <a:normAutofit/>
+          </a:bodyPr>
+          <a:lstStyle/>
+          <a:p>
+            <a:r>
+              <a:rPr lang="en-US" dirty="0"/>
+              <a:t>Thank You!</a:t>
+            </a:r>
+          </a:p>
+        </p:txBody>
+      </p:sp>
+      <p:sp>
+        <p:nvSpPr>
+          <p:cNvPr id="3" name="Subtitle 2">
+            <a:extLst>
+              <a:ext uri="{FF2B5EF4-FFF2-40B4-BE49-F238E27FC236}">
+                <a16:creationId xmlns:a16="http://schemas.microsoft.com/office/drawing/2014/main" id="{4B64FA72-B055-4AE3-A6FD-8071BD687CBE}"/>
+              </a:ext>
+            </a:extLst>
+          </p:cNvPr>
+          <p:cNvSpPr>
+            <a:spLocks noGrp="1"/>
+          </p:cNvSpPr>
+          <p:nvPr>
+            <p:ph type="subTitle" idx="1"/>
+          </p:nvPr>
+        </p:nvSpPr>
+        <p:spPr>
+          <a:xfrm>
+            <a:off x="3962399" y="4995332"/>
+            <a:ext cx="7197726" cy="1405467"/>
+          </a:xfrm>
+        </p:spPr>
+        <p:txBody>
+          <a:bodyPr>
+            <a:normAutofit/>
+          </a:bodyPr>
+          <a:lstStyle/>
+          <a:p>
+            <a:r>
+              <a:rPr lang="en-US" dirty="0">
+                <a:solidFill>
+                  <a:schemeClr val="accent1">
+                    <a:lumMod val="40000"/>
+                    <a:lumOff val="60000"/>
+                  </a:schemeClr>
+                </a:solidFill>
+              </a:rPr>
+              <a:t>someone@example.com</a:t>
+            </a:r>
+          </a:p>
+        </p:txBody>
+      </p:sp>
+    </p:spTree>
+    <p:extLst>
+      <p:ext uri="{BB962C8B-B14F-4D97-AF65-F5344CB8AC3E}">
+        <p14:creationId xmlns:p14="http://schemas.microsoft.com/office/powerpoint/2010/main" val="2939930866"/>
+      </p:ext>
+    </p:extLst>
+  </p:cSld>
+  <p:clrMapOvr>
+    <a:masterClrMapping/>
+  </p:clrMapOvr>
+</p:sld>
+</file>
+
 <file path=ppt/slides/slide2.xml><?xml version="1.0" encoding="utf-8"?>
 <p:sld xmlns:a="http://schemas.openxmlformats.org/drawingml/2006/main" xmlns:r="http://schemas.openxmlformats.org/officeDocument/2006/relationships" xmlns:p="http://schemas.openxmlformats.org/presentationml/2006/main">
   <p:cSld>
@@ -16782,9 +17219,16 @@
             <p:ph idx="1"/>
           </p:nvPr>
         </p:nvSpPr>
-        <p:spPr/>
+        <p:spPr>
+          <a:xfrm>
+            <a:off x="685801" y="2142067"/>
+            <a:ext cx="10131425" cy="3649133"/>
+          </a:xfrm>
+        </p:spPr>
         <p:txBody>
-          <a:bodyPr/>
+          <a:bodyPr>
+            <a:normAutofit lnSpcReduction="10000"/>
+          </a:bodyPr>
           <a:lstStyle/>
           <a:p>
             <a:r>
@@ -16821,11 +17265,466 @@
             </a:r>
             <a:r>
               <a:rPr lang="ro-RO" dirty="0"/>
-              <a:t> buffer in </a:t>
+              <a:t> </a:t>
+            </a:r>
+            <a:r>
+              <a:rPr lang="en-US" dirty="0"/>
+              <a:t>shader</a:t>
+            </a:r>
+            <a:r>
+              <a:rPr lang="ro-RO" dirty="0"/>
+              <a:t> in </a:t>
             </a:r>
             <a:r>
               <a:rPr lang="ro-RO" dirty="0" err="1"/>
               <a:t>Unity</a:t>
+            </a:r>
+            <a:endParaRPr lang="en-US" dirty="0"/>
+          </a:p>
+          <a:p>
+            <a:r>
+              <a:rPr lang="en-US" dirty="0"/>
+              <a:t>Se </a:t>
+            </a:r>
+            <a:r>
+              <a:rPr lang="en-US" dirty="0" err="1"/>
+              <a:t>foloseste</a:t>
+            </a:r>
+            <a:r>
+              <a:rPr lang="en-US" dirty="0"/>
+              <a:t> un thread front wave de (8,8,8)</a:t>
+            </a:r>
+          </a:p>
+          <a:p>
+            <a:r>
+              <a:rPr lang="en-US" dirty="0" err="1"/>
+              <a:t>Toate</a:t>
+            </a:r>
+            <a:r>
+              <a:rPr lang="en-US" dirty="0"/>
+              <a:t> </a:t>
+            </a:r>
+            <a:r>
+              <a:rPr lang="en-US" dirty="0" err="1"/>
+              <a:t>valorile</a:t>
+            </a:r>
+            <a:r>
+              <a:rPr lang="en-US" dirty="0"/>
+              <a:t> </a:t>
+            </a:r>
+            <a:r>
+              <a:rPr lang="en-US" dirty="0" err="1"/>
+              <a:t>si</a:t>
+            </a:r>
+            <a:r>
+              <a:rPr lang="en-US" dirty="0"/>
+              <a:t> </a:t>
+            </a:r>
+            <a:r>
+              <a:rPr lang="en-US" dirty="0" err="1"/>
+              <a:t>parametrii</a:t>
+            </a:r>
+            <a:r>
+              <a:rPr lang="en-US" dirty="0"/>
+              <a:t> sunt </a:t>
+            </a:r>
+            <a:r>
+              <a:rPr lang="en-US" dirty="0" err="1"/>
+              <a:t>transmisi</a:t>
+            </a:r>
+            <a:r>
+              <a:rPr lang="en-US" dirty="0"/>
+              <a:t> </a:t>
+            </a:r>
+            <a:r>
+              <a:rPr lang="en-US" dirty="0" err="1"/>
+              <a:t>prin</a:t>
+            </a:r>
+            <a:r>
+              <a:rPr lang="en-US" dirty="0"/>
+              <a:t> </a:t>
+            </a:r>
+            <a:r>
+              <a:rPr lang="en-US" dirty="0" err="1"/>
+              <a:t>variabile</a:t>
+            </a:r>
+            <a:r>
+              <a:rPr lang="en-US" dirty="0"/>
+              <a:t> “</a:t>
+            </a:r>
+            <a:r>
+              <a:rPr lang="en-US" dirty="0" err="1"/>
+              <a:t>globale</a:t>
+            </a:r>
+            <a:r>
+              <a:rPr lang="en-US" dirty="0"/>
+              <a:t>” </a:t>
+            </a:r>
+            <a:r>
+              <a:rPr lang="en-US" dirty="0" err="1"/>
+              <a:t>catre</a:t>
+            </a:r>
+            <a:r>
+              <a:rPr lang="en-US" dirty="0"/>
+              <a:t> shader.</a:t>
+            </a:r>
+          </a:p>
+          <a:p>
+            <a:r>
+              <a:rPr lang="en-US" dirty="0" err="1"/>
+              <a:t>Deoarece</a:t>
+            </a:r>
+            <a:r>
+              <a:rPr lang="en-US" dirty="0"/>
+              <a:t> </a:t>
+            </a:r>
+            <a:r>
+              <a:rPr lang="en-US" dirty="0" err="1"/>
+              <a:t>algoritmul</a:t>
+            </a:r>
+            <a:r>
+              <a:rPr lang="en-US" dirty="0"/>
+              <a:t> </a:t>
+            </a:r>
+            <a:r>
+              <a:rPr lang="en-US" dirty="0" err="1"/>
+              <a:t>necesita</a:t>
+            </a:r>
+            <a:r>
+              <a:rPr lang="en-US" dirty="0"/>
+              <a:t> </a:t>
+            </a:r>
+            <a:r>
+              <a:rPr lang="en-US" dirty="0" err="1"/>
+              <a:t>tabele</a:t>
+            </a:r>
+            <a:r>
+              <a:rPr lang="en-US" dirty="0"/>
+              <a:t> </a:t>
+            </a:r>
+            <a:r>
+              <a:rPr lang="en-US" dirty="0" err="1"/>
+              <a:t>mari</a:t>
+            </a:r>
+            <a:r>
+              <a:rPr lang="en-US" dirty="0"/>
+              <a:t> de </a:t>
+            </a:r>
+            <a:r>
+              <a:rPr lang="en-US" dirty="0" err="1"/>
+              <a:t>pozitii</a:t>
+            </a:r>
+            <a:r>
+              <a:rPr lang="en-US" dirty="0"/>
+              <a:t> </a:t>
+            </a:r>
+            <a:r>
+              <a:rPr lang="en-US" dirty="0" err="1"/>
+              <a:t>si</a:t>
+            </a:r>
+            <a:r>
+              <a:rPr lang="en-US" dirty="0"/>
+              <a:t> date, care nu pot fi </a:t>
+            </a:r>
+            <a:r>
+              <a:rPr lang="en-US" dirty="0" err="1"/>
+              <a:t>stocate</a:t>
+            </a:r>
+            <a:r>
+              <a:rPr lang="en-US" dirty="0"/>
+              <a:t> </a:t>
+            </a:r>
+            <a:r>
+              <a:rPr lang="en-US" dirty="0" err="1"/>
+              <a:t>impreuna</a:t>
+            </a:r>
+            <a:r>
+              <a:rPr lang="en-US" dirty="0"/>
+              <a:t> </a:t>
+            </a:r>
+            <a:r>
+              <a:rPr lang="en-US" dirty="0" err="1"/>
+              <a:t>datorita</a:t>
+            </a:r>
+            <a:r>
+              <a:rPr lang="en-US" dirty="0"/>
+              <a:t> </a:t>
+            </a:r>
+            <a:r>
+              <a:rPr lang="en-US" dirty="0" err="1"/>
+              <a:t>dimensiunii</a:t>
+            </a:r>
+            <a:r>
+              <a:rPr lang="en-US" dirty="0"/>
+              <a:t> </a:t>
+            </a:r>
+            <a:r>
+              <a:rPr lang="en-US" dirty="0" err="1"/>
+              <a:t>reduse</a:t>
+            </a:r>
+            <a:r>
+              <a:rPr lang="en-US" dirty="0"/>
+              <a:t> ale </a:t>
+            </a:r>
+            <a:r>
+              <a:rPr lang="en-US" dirty="0" err="1"/>
+              <a:t>memoriei</a:t>
+            </a:r>
+            <a:r>
+              <a:rPr lang="en-US" dirty="0"/>
+              <a:t> </a:t>
+            </a:r>
+            <a:r>
+              <a:rPr lang="en-US" dirty="0" err="1"/>
+              <a:t>unui</a:t>
+            </a:r>
+            <a:r>
+              <a:rPr lang="en-US" dirty="0"/>
+              <a:t> shader, </a:t>
+            </a:r>
+            <a:r>
+              <a:rPr lang="en-US" dirty="0" err="1"/>
+              <a:t>folosesc</a:t>
+            </a:r>
+            <a:r>
+              <a:rPr lang="en-US" dirty="0"/>
+              <a:t> un buffer 1D care </a:t>
+            </a:r>
+            <a:r>
+              <a:rPr lang="en-US" dirty="0" err="1"/>
+              <a:t>este</a:t>
+            </a:r>
+            <a:r>
+              <a:rPr lang="en-US" dirty="0"/>
+              <a:t> </a:t>
+            </a:r>
+            <a:r>
+              <a:rPr lang="en-US" dirty="0" err="1"/>
+              <a:t>populat</a:t>
+            </a:r>
+            <a:r>
+              <a:rPr lang="en-US" dirty="0"/>
+              <a:t> pe CPU </a:t>
+            </a:r>
+            <a:r>
+              <a:rPr lang="en-US" dirty="0" err="1"/>
+              <a:t>dintr</a:t>
+            </a:r>
+            <a:r>
+              <a:rPr lang="en-US" dirty="0"/>
+              <a:t>-un array 2D.</a:t>
+            </a:r>
+          </a:p>
+          <a:p>
+            <a:r>
+              <a:rPr lang="en-US" dirty="0" err="1"/>
+              <a:t>Codul</a:t>
+            </a:r>
+            <a:r>
+              <a:rPr lang="en-US" dirty="0"/>
+              <a:t> e </a:t>
+            </a:r>
+            <a:r>
+              <a:rPr lang="en-US" dirty="0" err="1"/>
+              <a:t>optimizat</a:t>
+            </a:r>
+            <a:r>
+              <a:rPr lang="en-US" dirty="0"/>
+              <a:t> </a:t>
+            </a:r>
+            <a:r>
+              <a:rPr lang="en-US" dirty="0" err="1"/>
+              <a:t>pentru</a:t>
+            </a:r>
+            <a:r>
+              <a:rPr lang="en-US" dirty="0"/>
+              <a:t> </a:t>
+            </a:r>
+            <a:r>
+              <a:rPr lang="en-US" dirty="0" err="1"/>
+              <a:t>executia</a:t>
+            </a:r>
+            <a:r>
+              <a:rPr lang="en-US" dirty="0"/>
+              <a:t> in </a:t>
+            </a:r>
+            <a:r>
+              <a:rPr lang="en-US" dirty="0" err="1"/>
+              <a:t>paralel</a:t>
+            </a:r>
+            <a:r>
+              <a:rPr lang="en-US" dirty="0"/>
+              <a:t> a </a:t>
+            </a:r>
+            <a:r>
+              <a:rPr lang="en-US" dirty="0" err="1"/>
+              <a:t>functiilor</a:t>
+            </a:r>
+            <a:r>
+              <a:rPr lang="en-US" dirty="0"/>
+              <a:t> </a:t>
+            </a:r>
+            <a:r>
+              <a:rPr lang="en-US" dirty="0" err="1"/>
+              <a:t>matematice</a:t>
+            </a:r>
+            <a:r>
+              <a:rPr lang="en-US" dirty="0"/>
+              <a:t>. De </a:t>
+            </a:r>
+            <a:r>
+              <a:rPr lang="en-US" dirty="0" err="1"/>
+              <a:t>exemplu</a:t>
+            </a:r>
+            <a:r>
+              <a:rPr lang="en-US" dirty="0"/>
+              <a:t>:</a:t>
+            </a:r>
+          </a:p>
+          <a:p>
+            <a:pPr lvl="1"/>
+            <a:r>
+              <a:rPr lang="en-US" dirty="0"/>
+              <a:t>Sunt </a:t>
+            </a:r>
+            <a:r>
+              <a:rPr lang="en-US" dirty="0" err="1"/>
+              <a:t>folosite</a:t>
+            </a:r>
+            <a:r>
+              <a:rPr lang="en-US" dirty="0"/>
+              <a:t> </a:t>
+            </a:r>
+            <a:r>
+              <a:rPr lang="en-US" dirty="0" err="1"/>
+              <a:t>comenzile</a:t>
+            </a:r>
+            <a:r>
+              <a:rPr lang="en-US" dirty="0"/>
+              <a:t> </a:t>
+            </a:r>
+            <a:r>
+              <a:rPr lang="en-US" dirty="0" err="1"/>
+              <a:t>deja</a:t>
+            </a:r>
+            <a:r>
+              <a:rPr lang="en-US" dirty="0"/>
+              <a:t> definite </a:t>
+            </a:r>
+            <a:r>
+              <a:rPr lang="en-US" dirty="0" err="1"/>
+              <a:t>si</a:t>
+            </a:r>
+            <a:r>
+              <a:rPr lang="en-US" dirty="0"/>
+              <a:t> </a:t>
+            </a:r>
+            <a:r>
+              <a:rPr lang="en-US" dirty="0" err="1"/>
+              <a:t>optimizate</a:t>
+            </a:r>
+            <a:r>
+              <a:rPr lang="en-US" dirty="0"/>
+              <a:t> lerp, </a:t>
+            </a:r>
+            <a:r>
+              <a:rPr lang="en-US" dirty="0" err="1"/>
+              <a:t>mul</a:t>
+            </a:r>
+            <a:r>
+              <a:rPr lang="en-US" dirty="0"/>
+              <a:t>, any, etc.</a:t>
+            </a:r>
+          </a:p>
+          <a:p>
+            <a:pPr lvl="1"/>
+            <a:r>
+              <a:rPr lang="en-US" dirty="0"/>
+              <a:t>In for-</a:t>
+            </a:r>
+            <a:r>
+              <a:rPr lang="en-US" dirty="0" err="1"/>
+              <a:t>uri</a:t>
+            </a:r>
+            <a:r>
+              <a:rPr lang="en-US" dirty="0"/>
+              <a:t>, if-urile sunt </a:t>
+            </a:r>
+            <a:r>
+              <a:rPr lang="en-US" dirty="0" err="1"/>
+              <a:t>controlate</a:t>
+            </a:r>
+            <a:r>
+              <a:rPr lang="en-US" dirty="0"/>
+              <a:t> </a:t>
+            </a:r>
+            <a:r>
+              <a:rPr lang="en-US" dirty="0" err="1"/>
+              <a:t>prin</a:t>
+            </a:r>
+            <a:r>
+              <a:rPr lang="en-US" dirty="0"/>
+              <a:t> </a:t>
+            </a:r>
+            <a:r>
+              <a:rPr lang="en-US" dirty="0" err="1"/>
+              <a:t>flaguri</a:t>
+            </a:r>
+            <a:r>
+              <a:rPr lang="en-US" dirty="0"/>
+              <a:t> 0 </a:t>
+            </a:r>
+            <a:r>
+              <a:rPr lang="en-US" dirty="0" err="1"/>
+              <a:t>sau</a:t>
+            </a:r>
+            <a:r>
+              <a:rPr lang="en-US" dirty="0"/>
+              <a:t> 1 cu care sunt </a:t>
+            </a:r>
+            <a:r>
+              <a:rPr lang="en-US" dirty="0" err="1"/>
+              <a:t>inmultite</a:t>
+            </a:r>
+            <a:r>
+              <a:rPr lang="en-US" dirty="0"/>
+              <a:t> </a:t>
+            </a:r>
+            <a:r>
+              <a:rPr lang="en-US" dirty="0" err="1"/>
+              <a:t>ecuatiile</a:t>
+            </a:r>
+            <a:r>
+              <a:rPr lang="en-US" dirty="0"/>
+              <a:t> conditionate. </a:t>
+            </a:r>
+            <a:r>
+              <a:rPr lang="en-US" dirty="0" err="1"/>
+              <a:t>Astfel</a:t>
+            </a:r>
+            <a:r>
+              <a:rPr lang="en-US" dirty="0"/>
+              <a:t> se </a:t>
+            </a:r>
+            <a:r>
+              <a:rPr lang="en-US" dirty="0" err="1"/>
+              <a:t>evita</a:t>
+            </a:r>
+            <a:r>
+              <a:rPr lang="en-US" dirty="0"/>
+              <a:t> </a:t>
+            </a:r>
+            <a:r>
+              <a:rPr lang="en-US" dirty="0" err="1"/>
+              <a:t>scindarea</a:t>
+            </a:r>
+            <a:r>
+              <a:rPr lang="en-US" dirty="0"/>
+              <a:t> thread front-</a:t>
+            </a:r>
+            <a:r>
+              <a:rPr lang="en-US" dirty="0" err="1"/>
+              <a:t>ului</a:t>
             </a:r>
             <a:endParaRPr lang="ro-RO" dirty="0"/>
           </a:p>
@@ -16861,236 +17760,12 @@
           <a:chExt cx="0" cy="0"/>
         </a:xfrm>
       </p:grpSpPr>
-      <p:pic>
-        <p:nvPicPr>
-          <p:cNvPr id="4" name="Content Placeholder 3" descr="night sky with mountains on the horizon">
-            <a:extLst>
-              <a:ext uri="{FF2B5EF4-FFF2-40B4-BE49-F238E27FC236}">
-                <a16:creationId xmlns:a16="http://schemas.microsoft.com/office/drawing/2014/main" id="{2739CFE1-3E46-48B5-9BDB-769492BA7A53}"/>
-              </a:ext>
-            </a:extLst>
-          </p:cNvPr>
-          <p:cNvPicPr>
-            <a:picLocks noGrp="1" noChangeAspect="1"/>
-          </p:cNvPicPr>
-          <p:nvPr>
-            <p:ph sz="half" idx="1"/>
-          </p:nvPr>
-        </p:nvPicPr>
-        <p:blipFill rotWithShape="1">
-          <a:blip r:embed="rId3"/>
-          <a:srcRect t="4555" b="4555"/>
-          <a:stretch/>
-        </p:blipFill>
-        <p:spPr>
-          <a:xfrm>
-            <a:off x="-600" y="-1226"/>
-            <a:ext cx="12193200" cy="6860452"/>
-          </a:xfrm>
-          <a:custGeom>
-            <a:avLst/>
-            <a:gdLst/>
-            <a:ahLst/>
-            <a:cxnLst/>
-            <a:rect l="l" t="t" r="r" b="b"/>
-            <a:pathLst>
-              <a:path w="12192000" h="6858000">
-                <a:moveTo>
-                  <a:pt x="6090347" y="706999"/>
-                </a:moveTo>
-                <a:cubicBezTo>
-                  <a:pt x="4588386" y="706999"/>
-                  <a:pt x="3370806" y="1924579"/>
-                  <a:pt x="3370806" y="3426541"/>
-                </a:cubicBezTo>
-                <a:cubicBezTo>
-                  <a:pt x="3370806" y="4928503"/>
-                  <a:pt x="4588386" y="6146083"/>
-                  <a:pt x="6090347" y="6146083"/>
-                </a:cubicBezTo>
-                <a:cubicBezTo>
-                  <a:pt x="7592308" y="6146083"/>
-                  <a:pt x="8809888" y="4928503"/>
-                  <a:pt x="8809888" y="3426541"/>
-                </a:cubicBezTo>
-                <a:cubicBezTo>
-                  <a:pt x="8809888" y="1924579"/>
-                  <a:pt x="7592308" y="706999"/>
-                  <a:pt x="6090347" y="706999"/>
-                </a:cubicBezTo>
-                <a:close/>
-                <a:moveTo>
-                  <a:pt x="6082303" y="247854"/>
-                </a:moveTo>
-                <a:cubicBezTo>
-                  <a:pt x="7836802" y="247854"/>
-                  <a:pt x="9259104" y="1671227"/>
-                  <a:pt x="9259104" y="3427045"/>
-                </a:cubicBezTo>
-                <a:cubicBezTo>
-                  <a:pt x="9259104" y="5182864"/>
-                  <a:pt x="7836802" y="6606237"/>
-                  <a:pt x="6082303" y="6606237"/>
-                </a:cubicBezTo>
-                <a:cubicBezTo>
-                  <a:pt x="4327804" y="6606237"/>
-                  <a:pt x="2905502" y="5182864"/>
-                  <a:pt x="2905502" y="3427045"/>
-                </a:cubicBezTo>
-                <a:cubicBezTo>
-                  <a:pt x="2905502" y="1671227"/>
-                  <a:pt x="4327804" y="247854"/>
-                  <a:pt x="6082303" y="247854"/>
-                </a:cubicBezTo>
-                <a:close/>
-                <a:moveTo>
-                  <a:pt x="9560257" y="0"/>
-                </a:moveTo>
-                <a:lnTo>
-                  <a:pt x="12192000" y="0"/>
-                </a:lnTo>
-                <a:lnTo>
-                  <a:pt x="12192000" y="6858000"/>
-                </a:lnTo>
-                <a:lnTo>
-                  <a:pt x="9560255" y="6858000"/>
-                </a:lnTo>
-                <a:lnTo>
-                  <a:pt x="9704262" y="6706843"/>
-                </a:lnTo>
-                <a:cubicBezTo>
-                  <a:pt x="10490530" y="5841105"/>
-                  <a:pt x="10969748" y="4691058"/>
-                  <a:pt x="10969748" y="3428999"/>
-                </a:cubicBezTo>
-                <a:cubicBezTo>
-                  <a:pt x="10969748" y="2166941"/>
-                  <a:pt x="10490530" y="1016894"/>
-                  <a:pt x="9704262" y="151155"/>
-                </a:cubicBezTo>
-                <a:close/>
-                <a:moveTo>
-                  <a:pt x="7947654" y="0"/>
-                </a:moveTo>
-                <a:lnTo>
-                  <a:pt x="8099035" y="0"/>
-                </a:lnTo>
-                <a:lnTo>
-                  <a:pt x="8158569" y="34257"/>
-                </a:lnTo>
-                <a:cubicBezTo>
-                  <a:pt x="9305381" y="731601"/>
-                  <a:pt x="10071441" y="1993601"/>
-                  <a:pt x="10071441" y="3434659"/>
-                </a:cubicBezTo>
-                <a:cubicBezTo>
-                  <a:pt x="10071441" y="4875717"/>
-                  <a:pt x="9305381" y="6137716"/>
-                  <a:pt x="8158569" y="6835060"/>
-                </a:cubicBezTo>
-                <a:lnTo>
-                  <a:pt x="8118703" y="6858000"/>
-                </a:lnTo>
-                <a:lnTo>
-                  <a:pt x="7923440" y="6858000"/>
-                </a:lnTo>
-                <a:lnTo>
-                  <a:pt x="7938929" y="6850061"/>
-                </a:lnTo>
-                <a:cubicBezTo>
-                  <a:pt x="9153123" y="6189975"/>
-                  <a:pt x="9977382" y="4902579"/>
-                  <a:pt x="9977382" y="3422520"/>
-                </a:cubicBezTo>
-                <a:cubicBezTo>
-                  <a:pt x="9977382" y="2009739"/>
-                  <a:pt x="9226353" y="772500"/>
-                  <a:pt x="8102044" y="88839"/>
-                </a:cubicBezTo>
-                <a:close/>
-                <a:moveTo>
-                  <a:pt x="4097777" y="0"/>
-                </a:moveTo>
-                <a:lnTo>
-                  <a:pt x="4216953" y="0"/>
-                </a:lnTo>
-                <a:lnTo>
-                  <a:pt x="4062563" y="88839"/>
-                </a:lnTo>
-                <a:cubicBezTo>
-                  <a:pt x="2938253" y="772500"/>
-                  <a:pt x="2187224" y="2009739"/>
-                  <a:pt x="2187224" y="3422520"/>
-                </a:cubicBezTo>
-                <a:cubicBezTo>
-                  <a:pt x="2187224" y="4902579"/>
-                  <a:pt x="3011483" y="6189975"/>
-                  <a:pt x="4225677" y="6850061"/>
-                </a:cubicBezTo>
-                <a:lnTo>
-                  <a:pt x="4241167" y="6858000"/>
-                </a:lnTo>
-                <a:lnTo>
-                  <a:pt x="4078110" y="6858000"/>
-                </a:lnTo>
-                <a:lnTo>
-                  <a:pt x="4038243" y="6835060"/>
-                </a:lnTo>
-                <a:cubicBezTo>
-                  <a:pt x="2891431" y="6137716"/>
-                  <a:pt x="2125371" y="4875717"/>
-                  <a:pt x="2125371" y="3434659"/>
-                </a:cubicBezTo>
-                <a:cubicBezTo>
-                  <a:pt x="2125371" y="1993601"/>
-                  <a:pt x="2891431" y="731601"/>
-                  <a:pt x="4038243" y="34257"/>
-                </a:cubicBezTo>
-                <a:close/>
-                <a:moveTo>
-                  <a:pt x="0" y="0"/>
-                </a:moveTo>
-                <a:lnTo>
-                  <a:pt x="2636555" y="0"/>
-                </a:lnTo>
-                <a:lnTo>
-                  <a:pt x="2492551" y="151155"/>
-                </a:lnTo>
-                <a:cubicBezTo>
-                  <a:pt x="1706282" y="1016894"/>
-                  <a:pt x="1227064" y="2166941"/>
-                  <a:pt x="1227064" y="3428999"/>
-                </a:cubicBezTo>
-                <a:cubicBezTo>
-                  <a:pt x="1227064" y="4691058"/>
-                  <a:pt x="1706282" y="5841105"/>
-                  <a:pt x="2492551" y="6706843"/>
-                </a:cubicBezTo>
-                <a:lnTo>
-                  <a:pt x="2636557" y="6858000"/>
-                </a:lnTo>
-                <a:lnTo>
-                  <a:pt x="0" y="6858000"/>
-                </a:lnTo>
-                <a:close/>
-              </a:path>
-            </a:pathLst>
-          </a:custGeom>
-          <a:ln w="60325" cmpd="dbl">
-            <a:solidFill>
-              <a:schemeClr val="tx1">
-                <a:alpha val="40000"/>
-              </a:schemeClr>
-            </a:solidFill>
-          </a:ln>
-        </p:spPr>
-      </p:pic>
       <p:sp>
         <p:nvSpPr>
           <p:cNvPr id="2" name="Title 1">
             <a:extLst>
               <a:ext uri="{FF2B5EF4-FFF2-40B4-BE49-F238E27FC236}">
-                <a16:creationId xmlns:a16="http://schemas.microsoft.com/office/drawing/2014/main" id="{144E241E-3110-4B1C-B9B0-F17B90FEEC1D}"/>
+                <a16:creationId xmlns:a16="http://schemas.microsoft.com/office/drawing/2014/main" id="{9A8414C7-50A6-45C4-A3C2-7E1FF7ABD995}"/>
               </a:ext>
             </a:extLst>
           </p:cNvPr>
@@ -17101,22 +17776,187 @@
             <p:ph type="title"/>
           </p:nvPr>
         </p:nvSpPr>
+        <p:spPr/>
+        <p:txBody>
+          <a:bodyPr/>
+          <a:lstStyle/>
+          <a:p>
+            <a:r>
+              <a:rPr lang="en-US" dirty="0" err="1"/>
+              <a:t>Optimizari</a:t>
+            </a:r>
+            <a:endParaRPr lang="ro-RO" dirty="0"/>
+          </a:p>
+        </p:txBody>
+      </p:sp>
+      <p:pic>
+        <p:nvPicPr>
+          <p:cNvPr id="4" name="Content Placeholder 3">
+            <a:extLst>
+              <a:ext uri="{FF2B5EF4-FFF2-40B4-BE49-F238E27FC236}">
+                <a16:creationId xmlns:a16="http://schemas.microsoft.com/office/drawing/2014/main" id="{881C68C5-39AE-4C22-B632-69BD86B2C3D4}"/>
+              </a:ext>
+              <a:ext uri="{C183D7F6-B498-43B3-948B-1728B52AA6E4}">
+                <adec:decorative xmlns:adec="http://schemas.microsoft.com/office/drawing/2017/decorative" val="0"/>
+              </a:ext>
+            </a:extLst>
+          </p:cNvPr>
+          <p:cNvPicPr>
+            <a:picLocks noGrp="1" noChangeAspect="1"/>
+          </p:cNvPicPr>
+          <p:nvPr>
+            <p:ph idx="1"/>
+          </p:nvPr>
+        </p:nvPicPr>
+        <p:blipFill>
+          <a:blip r:embed="rId2"/>
+          <a:stretch>
+            <a:fillRect/>
+          </a:stretch>
+        </p:blipFill>
         <p:spPr>
           <a:xfrm>
-            <a:off x="2408903" y="787400"/>
-            <a:ext cx="7390680" cy="1278467"/>
+            <a:off x="834053" y="1902754"/>
+            <a:ext cx="6630325" cy="771633"/>
           </a:xfrm>
+          <a:prstGeom prst="roundRect">
+            <a:avLst>
+              <a:gd name="adj" fmla="val 8594"/>
+            </a:avLst>
+          </a:prstGeom>
+          <a:solidFill>
+            <a:srgbClr val="FFFFFF">
+              <a:shade val="85000"/>
+            </a:srgbClr>
+          </a:solidFill>
+          <a:ln>
+            <a:noFill/>
+          </a:ln>
+          <a:effectLst>
+            <a:reflection blurRad="12700" stA="38000" endPos="28000" dist="5000" dir="5400000" sy="-100000" algn="bl" rotWithShape="0"/>
+          </a:effectLst>
+        </p:spPr>
+      </p:pic>
+      <p:pic>
+        <p:nvPicPr>
+          <p:cNvPr id="5" name="Picture 4">
+            <a:extLst>
+              <a:ext uri="{FF2B5EF4-FFF2-40B4-BE49-F238E27FC236}">
+                <a16:creationId xmlns:a16="http://schemas.microsoft.com/office/drawing/2014/main" id="{B09DDF6D-A4D4-405C-ACB0-5A9CE63BD79E}"/>
+              </a:ext>
+            </a:extLst>
+          </p:cNvPr>
+          <p:cNvPicPr>
+            <a:picLocks noChangeAspect="1"/>
+          </p:cNvPicPr>
+          <p:nvPr/>
+        </p:nvPicPr>
+        <p:blipFill>
+          <a:blip r:embed="rId3"/>
+          <a:stretch>
+            <a:fillRect/>
+          </a:stretch>
+        </p:blipFill>
+        <p:spPr>
+          <a:xfrm>
+            <a:off x="441820" y="3006607"/>
+            <a:ext cx="11308360" cy="984004"/>
+          </a:xfrm>
+          <a:prstGeom prst="roundRect">
+            <a:avLst>
+              <a:gd name="adj" fmla="val 8594"/>
+            </a:avLst>
+          </a:prstGeom>
+          <a:solidFill>
+            <a:srgbClr val="FFFFFF">
+              <a:shade val="85000"/>
+            </a:srgbClr>
+          </a:solidFill>
+          <a:ln>
+            <a:noFill/>
+          </a:ln>
+          <a:effectLst>
+            <a:reflection blurRad="12700" stA="38000" endPos="28000" dist="5000" dir="5400000" sy="-100000" algn="bl" rotWithShape="0"/>
+          </a:effectLst>
+        </p:spPr>
+      </p:pic>
+      <p:pic>
+        <p:nvPicPr>
+          <p:cNvPr id="6" name="Picture 5">
+            <a:extLst>
+              <a:ext uri="{FF2B5EF4-FFF2-40B4-BE49-F238E27FC236}">
+                <a16:creationId xmlns:a16="http://schemas.microsoft.com/office/drawing/2014/main" id="{6978ECAB-13E0-4585-9E5A-3E914A2D6766}"/>
+              </a:ext>
+            </a:extLst>
+          </p:cNvPr>
+          <p:cNvPicPr>
+            <a:picLocks noChangeAspect="1"/>
+          </p:cNvPicPr>
+          <p:nvPr/>
+        </p:nvPicPr>
+        <p:blipFill>
+          <a:blip r:embed="rId4"/>
+          <a:stretch>
+            <a:fillRect/>
+          </a:stretch>
+        </p:blipFill>
+        <p:spPr>
+          <a:xfrm>
+            <a:off x="834053" y="4245726"/>
+            <a:ext cx="6125430" cy="933580"/>
+          </a:xfrm>
+          <a:prstGeom prst="roundRect">
+            <a:avLst>
+              <a:gd name="adj" fmla="val 8594"/>
+            </a:avLst>
+          </a:prstGeom>
+          <a:solidFill>
+            <a:srgbClr val="FFFFFF">
+              <a:shade val="85000"/>
+            </a:srgbClr>
+          </a:solidFill>
+          <a:ln>
+            <a:noFill/>
+          </a:ln>
+          <a:effectLst>
+            <a:reflection blurRad="12700" stA="38000" endPos="28000" dist="5000" dir="5400000" sy="-100000" algn="bl" rotWithShape="0"/>
+          </a:effectLst>
+        </p:spPr>
+      </p:pic>
+      <p:sp>
+        <p:nvSpPr>
+          <p:cNvPr id="7" name="TextBox 6">
+            <a:extLst>
+              <a:ext uri="{FF2B5EF4-FFF2-40B4-BE49-F238E27FC236}">
+                <a16:creationId xmlns:a16="http://schemas.microsoft.com/office/drawing/2014/main" id="{45C05B5C-FA29-4F8C-864C-8BC709E0FCC9}"/>
+              </a:ext>
+            </a:extLst>
+          </p:cNvPr>
+          <p:cNvSpPr txBox="1"/>
+          <p:nvPr/>
+        </p:nvSpPr>
+        <p:spPr>
+          <a:xfrm>
+            <a:off x="2223082" y="5179306"/>
+            <a:ext cx="4286028" cy="261610"/>
+          </a:xfrm>
+          <a:prstGeom prst="rect">
+            <a:avLst/>
+          </a:prstGeom>
+          <a:noFill/>
         </p:spPr>
         <p:txBody>
-          <a:bodyPr vert="horz" lIns="91440" tIns="45720" rIns="91440" bIns="45720" rtlCol="0" anchor="ctr">
-            <a:normAutofit/>
+          <a:bodyPr wrap="square" rtlCol="0">
+            <a:spAutoFit/>
           </a:bodyPr>
           <a:lstStyle/>
           <a:p>
-            <a:pPr algn="ctr"/>
-            <a:r>
-              <a:rPr lang="en-US" dirty="0"/>
-              <a:t>Network Technology</a:t>
+            <a:r>
+              <a:rPr lang="ro-RO" sz="1100" dirty="0">
+                <a:latin typeface="Arial" panose="020B0604020202020204" pitchFamily="34" charset="0"/>
+                <a:cs typeface="Arial" panose="020B0604020202020204" pitchFamily="34" charset="0"/>
+              </a:rPr>
+              <a:t>Accesarea unui tabel mare într-o forma liniara</a:t>
             </a:r>
           </a:p>
         </p:txBody>
@@ -17124,7 +17964,7 @@
     </p:spTree>
     <p:extLst>
       <p:ext uri="{BB962C8B-B14F-4D97-AF65-F5344CB8AC3E}">
-        <p14:creationId xmlns:p14="http://schemas.microsoft.com/office/powerpoint/2010/main" val="1974828406"/>
+        <p14:creationId xmlns:p14="http://schemas.microsoft.com/office/powerpoint/2010/main" val="3844857940"/>
       </p:ext>
     </p:extLst>
   </p:cSld>
@@ -17151,48 +17991,12 @@
           <a:chExt cx="0" cy="0"/>
         </a:xfrm>
       </p:grpSpPr>
-      <p:pic>
-        <p:nvPicPr>
-          <p:cNvPr id="5" name="Picture 4" descr="light spots">
-            <a:extLst>
-              <a:ext uri="{FF2B5EF4-FFF2-40B4-BE49-F238E27FC236}">
-                <a16:creationId xmlns:a16="http://schemas.microsoft.com/office/drawing/2014/main" id="{20A520D0-11CF-4639-8537-F56A8A2FDCFD}"/>
-              </a:ext>
-            </a:extLst>
-          </p:cNvPr>
-          <p:cNvPicPr>
-            <a:picLocks noChangeAspect="1"/>
-          </p:cNvPicPr>
-          <p:nvPr/>
-        </p:nvPicPr>
-        <p:blipFill rotWithShape="1">
-          <a:blip r:embed="rId3">
-            <a:alphaModFix amt="20000"/>
-            <a:extLst>
-              <a:ext uri="{28A0092B-C50C-407E-A947-70E740481C1C}">
-                <a14:useLocalDpi xmlns:a14="http://schemas.microsoft.com/office/drawing/2010/main"/>
-              </a:ext>
-            </a:extLst>
-          </a:blip>
-          <a:srcRect/>
-          <a:stretch/>
-        </p:blipFill>
-        <p:spPr>
-          <a:xfrm>
-            <a:off x="20" y="10"/>
-            <a:ext cx="12191980" cy="6857990"/>
-          </a:xfrm>
-          <a:prstGeom prst="rect">
-            <a:avLst/>
-          </a:prstGeom>
-        </p:spPr>
-      </p:pic>
       <p:sp>
         <p:nvSpPr>
           <p:cNvPr id="2" name="Title 1">
             <a:extLst>
               <a:ext uri="{FF2B5EF4-FFF2-40B4-BE49-F238E27FC236}">
-                <a16:creationId xmlns:a16="http://schemas.microsoft.com/office/drawing/2014/main" id="{D44BCB7C-A6FC-4118-9027-468ECFDE6455}"/>
+                <a16:creationId xmlns:a16="http://schemas.microsoft.com/office/drawing/2014/main" id="{D3BE3D52-24B4-4C08-B977-7FBFFC50EBA8}"/>
               </a:ext>
             </a:extLst>
           </p:cNvPr>
@@ -17200,34 +18004,36 @@
             <a:spLocks noGrp="1"/>
           </p:cNvSpPr>
           <p:nvPr>
-            <p:ph type="ctrTitle"/>
+            <p:ph type="title"/>
           </p:nvPr>
         </p:nvSpPr>
-        <p:spPr>
-          <a:xfrm>
-            <a:off x="3962399" y="2573867"/>
-            <a:ext cx="7197726" cy="2421464"/>
-          </a:xfrm>
-        </p:spPr>
+        <p:spPr/>
         <p:txBody>
-          <a:bodyPr>
-            <a:normAutofit/>
-          </a:bodyPr>
+          <a:bodyPr/>
           <a:lstStyle/>
           <a:p>
             <a:r>
-              <a:rPr lang="en-US" dirty="0"/>
-              <a:t>Thank You!</a:t>
-            </a:r>
+              <a:rPr lang="ro-RO" dirty="0" err="1"/>
+              <a:t>Verlet</a:t>
+            </a:r>
+            <a:r>
+              <a:rPr lang="ro-RO" dirty="0"/>
+              <a:t> </a:t>
+            </a:r>
+            <a:r>
+              <a:rPr lang="ro-RO" dirty="0" err="1"/>
+              <a:t>integration</a:t>
+            </a:r>
+            <a:endParaRPr lang="ro-RO" dirty="0"/>
           </a:p>
         </p:txBody>
       </p:sp>
       <p:sp>
         <p:nvSpPr>
-          <p:cNvPr id="3" name="Subtitle 2">
+          <p:cNvPr id="3" name="Content Placeholder 2">
             <a:extLst>
               <a:ext uri="{FF2B5EF4-FFF2-40B4-BE49-F238E27FC236}">
-                <a16:creationId xmlns:a16="http://schemas.microsoft.com/office/drawing/2014/main" id="{4B64FA72-B055-4AE3-A6FD-8071BD687CBE}"/>
+                <a16:creationId xmlns:a16="http://schemas.microsoft.com/office/drawing/2014/main" id="{1F100E92-AB47-4DB5-8527-EDB17DA0BC92}"/>
               </a:ext>
             </a:extLst>
           </p:cNvPr>
@@ -17235,15 +18041,191 @@
             <a:spLocks noGrp="1"/>
           </p:cNvSpPr>
           <p:nvPr>
-            <p:ph type="subTitle" idx="1"/>
+            <p:ph idx="1"/>
           </p:nvPr>
         </p:nvSpPr>
-        <p:spPr>
-          <a:xfrm>
-            <a:off x="3962399" y="4995332"/>
-            <a:ext cx="7197726" cy="1405467"/>
-          </a:xfrm>
-        </p:spPr>
+        <p:spPr/>
+        <p:txBody>
+          <a:bodyPr/>
+          <a:lstStyle/>
+          <a:p>
+            <a:r>
+              <a:rPr lang="ro-RO" dirty="0"/>
+              <a:t>Am folosit </a:t>
+            </a:r>
+            <a:r>
+              <a:rPr lang="ro-RO" dirty="0" err="1"/>
+              <a:t>Verlet</a:t>
+            </a:r>
+            <a:r>
+              <a:rPr lang="ro-RO" dirty="0"/>
+              <a:t> </a:t>
+            </a:r>
+            <a:r>
+              <a:rPr lang="ro-RO" dirty="0" err="1"/>
+              <a:t>Integration</a:t>
+            </a:r>
+            <a:r>
+              <a:rPr lang="ro-RO" dirty="0"/>
+              <a:t> pentru a simula un sistem de puncte cu </a:t>
+            </a:r>
+            <a:r>
+              <a:rPr lang="ro-RO" dirty="0" err="1"/>
+              <a:t>constrangeri</a:t>
+            </a:r>
+            <a:r>
+              <a:rPr lang="ro-RO" dirty="0"/>
+              <a:t> intre ele.</a:t>
+            </a:r>
+          </a:p>
+          <a:p>
+            <a:r>
+              <a:rPr lang="ro-RO" dirty="0"/>
+              <a:t>Algoritmul e folosit pentru a calcula comportamentul plantelor sub apa.</a:t>
+            </a:r>
+          </a:p>
+          <a:p>
+            <a:r>
+              <a:rPr lang="ro-RO" dirty="0"/>
+              <a:t>Pentru prima data in </a:t>
+            </a:r>
+            <a:r>
+              <a:rPr lang="ro-RO" dirty="0" err="1"/>
+              <a:t>Unity</a:t>
+            </a:r>
+            <a:r>
+              <a:rPr lang="ro-RO" dirty="0"/>
+              <a:t>, algoritmul este integrat cu sistemul de coliziuni si metode de </a:t>
+            </a:r>
+            <a:r>
+              <a:rPr lang="ro-RO" dirty="0" err="1"/>
+              <a:t>RayTracing</a:t>
+            </a:r>
+            <a:r>
+              <a:rPr lang="ro-RO" dirty="0"/>
+              <a:t> pentru manipula plantele </a:t>
+            </a:r>
+            <a:r>
+              <a:rPr lang="ro-RO" dirty="0" err="1"/>
+              <a:t>cand</a:t>
+            </a:r>
+            <a:r>
+              <a:rPr lang="ro-RO" dirty="0"/>
+              <a:t> un vehicul </a:t>
+            </a:r>
+            <a:r>
+              <a:rPr lang="ro-RO" dirty="0" err="1"/>
+              <a:t>interactioneaza</a:t>
+            </a:r>
+            <a:r>
+              <a:rPr lang="ro-RO" dirty="0"/>
+              <a:t> cu ele. Aceasta implementare e realizata </a:t>
+            </a:r>
+            <a:r>
+              <a:rPr lang="ro-RO" dirty="0" err="1"/>
+              <a:t>intr</a:t>
+            </a:r>
+            <a:r>
+              <a:rPr lang="ro-RO" dirty="0"/>
+              <a:t>-un mod eficient:</a:t>
+            </a:r>
+          </a:p>
+          <a:p>
+            <a:pPr lvl="1"/>
+            <a:r>
+              <a:rPr lang="ro-RO" dirty="0"/>
+              <a:t>Este creat un </a:t>
+            </a:r>
+            <a:r>
+              <a:rPr lang="ro-RO" dirty="0" err="1"/>
+              <a:t>BoxCollider</a:t>
+            </a:r>
+            <a:r>
+              <a:rPr lang="ro-RO" dirty="0"/>
+              <a:t> ce </a:t>
+            </a:r>
+          </a:p>
+        </p:txBody>
+      </p:sp>
+    </p:spTree>
+    <p:extLst>
+      <p:ext uri="{BB962C8B-B14F-4D97-AF65-F5344CB8AC3E}">
+        <p14:creationId xmlns:p14="http://schemas.microsoft.com/office/powerpoint/2010/main" val="795342428"/>
+      </p:ext>
+    </p:extLst>
+  </p:cSld>
+  <p:clrMapOvr>
+    <a:masterClrMapping/>
+  </p:clrMapOvr>
+</p:sld>
+</file>
+
+<file path=ppt/slides/slide8.xml><?xml version="1.0" encoding="utf-8"?>
+<p:sld xmlns:a="http://schemas.openxmlformats.org/drawingml/2006/main" xmlns:r="http://schemas.openxmlformats.org/officeDocument/2006/relationships" xmlns:p="http://schemas.openxmlformats.org/presentationml/2006/main">
+  <p:cSld>
+    <p:spTree>
+      <p:nvGrpSpPr>
+        <p:cNvPr id="1" name=""/>
+        <p:cNvGrpSpPr/>
+        <p:nvPr/>
+      </p:nvGrpSpPr>
+      <p:grpSpPr>
+        <a:xfrm>
+          <a:off x="0" y="0"/>
+          <a:ext cx="0" cy="0"/>
+          <a:chOff x="0" y="0"/>
+          <a:chExt cx="0" cy="0"/>
+        </a:xfrm>
+      </p:grpSpPr>
+      <p:sp>
+        <p:nvSpPr>
+          <p:cNvPr id="2" name="Title 1">
+            <a:extLst>
+              <a:ext uri="{FF2B5EF4-FFF2-40B4-BE49-F238E27FC236}">
+                <a16:creationId xmlns:a16="http://schemas.microsoft.com/office/drawing/2014/main" id="{D22E4C12-7659-4591-A8B8-EE87B56DD8C6}"/>
+              </a:ext>
+            </a:extLst>
+          </p:cNvPr>
+          <p:cNvSpPr>
+            <a:spLocks noGrp="1"/>
+          </p:cNvSpPr>
+          <p:nvPr>
+            <p:ph type="title"/>
+          </p:nvPr>
+        </p:nvSpPr>
+        <p:spPr/>
+        <p:txBody>
+          <a:bodyPr/>
+          <a:lstStyle/>
+          <a:p>
+            <a:r>
+              <a:rPr lang="ro-RO" dirty="0" err="1"/>
+              <a:t>Terrain</a:t>
+            </a:r>
+            <a:r>
+              <a:rPr lang="ro-RO" dirty="0"/>
+              <a:t> generator</a:t>
+            </a:r>
+          </a:p>
+        </p:txBody>
+      </p:sp>
+      <p:sp>
+        <p:nvSpPr>
+          <p:cNvPr id="3" name="Content Placeholder 2">
+            <a:extLst>
+              <a:ext uri="{FF2B5EF4-FFF2-40B4-BE49-F238E27FC236}">
+                <a16:creationId xmlns:a16="http://schemas.microsoft.com/office/drawing/2014/main" id="{09F0C14C-5BF3-45BB-9621-29B8D4421DF0}"/>
+              </a:ext>
+            </a:extLst>
+          </p:cNvPr>
+          <p:cNvSpPr>
+            <a:spLocks noGrp="1"/>
+          </p:cNvSpPr>
+          <p:nvPr>
+            <p:ph idx="1"/>
+          </p:nvPr>
+        </p:nvSpPr>
+        <p:spPr/>
         <p:txBody>
           <a:bodyPr>
             <a:normAutofit/>
@@ -17251,15 +18233,207 @@
           <a:lstStyle/>
           <a:p>
             <a:r>
-              <a:rPr lang="en-US" dirty="0">
-                <a:solidFill>
-                  <a:schemeClr val="accent1">
-                    <a:lumMod val="40000"/>
-                    <a:lumOff val="60000"/>
-                  </a:schemeClr>
-                </a:solidFill>
-              </a:rPr>
-              <a:t>someone@example.com</a:t>
+              <a:rPr lang="ro-RO" dirty="0"/>
+              <a:t>Algoritmul de </a:t>
+            </a:r>
+            <a:r>
+              <a:rPr lang="ro-RO" dirty="0" err="1"/>
+              <a:t>Marching</a:t>
+            </a:r>
+            <a:r>
+              <a:rPr lang="ro-RO" dirty="0"/>
+              <a:t> </a:t>
+            </a:r>
+            <a:r>
+              <a:rPr lang="ro-RO" dirty="0" err="1"/>
+              <a:t>Cubes</a:t>
+            </a:r>
+            <a:r>
+              <a:rPr lang="ro-RO" dirty="0"/>
+              <a:t> este utilizat </a:t>
+            </a:r>
+            <a:r>
+              <a:rPr lang="ro-RO" dirty="0" err="1"/>
+              <a:t>intr-o</a:t>
+            </a:r>
+            <a:r>
+              <a:rPr lang="ro-RO" dirty="0"/>
+              <a:t> clasa de generare a </a:t>
+            </a:r>
+            <a:r>
+              <a:rPr lang="ro-RO" dirty="0" err="1"/>
+              <a:t>chunk</a:t>
+            </a:r>
+            <a:r>
+              <a:rPr lang="ro-RO" dirty="0"/>
+              <a:t>-urilor pentru teren.</a:t>
+            </a:r>
+          </a:p>
+          <a:p>
+            <a:r>
+              <a:rPr lang="ro-RO" dirty="0"/>
+              <a:t>O variabila </a:t>
+            </a:r>
+            <a:r>
+              <a:rPr lang="ro-RO" dirty="0" err="1"/>
+              <a:t>controleaza</a:t>
+            </a:r>
+            <a:r>
+              <a:rPr lang="ro-RO" dirty="0"/>
+              <a:t> step </a:t>
+            </a:r>
+            <a:r>
+              <a:rPr lang="ro-RO" dirty="0" err="1"/>
+              <a:t>size-ul</a:t>
+            </a:r>
+            <a:r>
+              <a:rPr lang="ro-RO" dirty="0"/>
+              <a:t> terenului – folosit pentru aspectul de terasare</a:t>
+            </a:r>
+          </a:p>
+          <a:p>
+            <a:r>
+              <a:rPr lang="ro-RO" dirty="0"/>
+              <a:t>Alte variabile </a:t>
+            </a:r>
+            <a:r>
+              <a:rPr lang="ro-RO" dirty="0" err="1"/>
+              <a:t>controleaza</a:t>
+            </a:r>
+            <a:r>
+              <a:rPr lang="ro-RO" dirty="0"/>
+              <a:t>:</a:t>
+            </a:r>
+          </a:p>
+          <a:p>
+            <a:pPr lvl="1"/>
+            <a:r>
+              <a:rPr lang="ro-RO" dirty="0"/>
+              <a:t>Lungimea bazei unui </a:t>
+            </a:r>
+            <a:r>
+              <a:rPr lang="ro-RO" dirty="0" err="1"/>
+              <a:t>chunk</a:t>
+            </a:r>
+            <a:endParaRPr lang="ro-RO" dirty="0"/>
+          </a:p>
+          <a:p>
+            <a:pPr lvl="1"/>
+            <a:r>
+              <a:rPr lang="ro-RO" dirty="0" err="1"/>
+              <a:t>Inaltimea</a:t>
+            </a:r>
+            <a:endParaRPr lang="ro-RO" dirty="0"/>
+          </a:p>
+          <a:p>
+            <a:pPr lvl="1"/>
+            <a:r>
+              <a:rPr lang="ro-RO" dirty="0"/>
+              <a:t>Raza de </a:t>
+            </a:r>
+            <a:r>
+              <a:rPr lang="ro-RO" dirty="0" err="1"/>
+              <a:t>incarcare</a:t>
+            </a:r>
+            <a:r>
+              <a:rPr lang="ro-RO" dirty="0"/>
+              <a:t> (se face </a:t>
+            </a:r>
+            <a:r>
+              <a:rPr lang="ro-RO" dirty="0" err="1"/>
+              <a:t>intr</a:t>
+            </a:r>
+            <a:r>
+              <a:rPr lang="ro-RO" dirty="0"/>
+              <a:t>-un cerc)</a:t>
+            </a:r>
+          </a:p>
+          <a:p>
+            <a:r>
+              <a:rPr lang="ro-RO" dirty="0" err="1"/>
+              <a:t>Chunkurile</a:t>
+            </a:r>
+            <a:r>
+              <a:rPr lang="ro-RO" dirty="0"/>
+              <a:t> nu sunt distruse in </a:t>
+            </a:r>
+            <a:r>
+              <a:rPr lang="ro-RO" dirty="0" err="1"/>
+              <a:t>intregime</a:t>
+            </a:r>
+            <a:r>
+              <a:rPr lang="ro-RO" dirty="0"/>
+              <a:t> ci la dezactivare sunt salvate </a:t>
+            </a:r>
+            <a:r>
+              <a:rPr lang="ro-RO" dirty="0" err="1"/>
+              <a:t>intr</a:t>
+            </a:r>
+            <a:r>
+              <a:rPr lang="ro-RO" dirty="0"/>
+              <a:t>-un cache de unde vor fi </a:t>
+            </a:r>
+            <a:r>
+              <a:rPr lang="ro-RO" dirty="0" err="1"/>
+              <a:t>reincarcate</a:t>
+            </a:r>
+            <a:r>
+              <a:rPr lang="ro-RO" dirty="0"/>
+              <a:t> la comanda.</a:t>
+            </a:r>
+          </a:p>
+          <a:p>
+            <a:r>
+              <a:rPr lang="ro-RO" dirty="0"/>
+              <a:t>Fiecare </a:t>
+            </a:r>
+            <a:r>
+              <a:rPr lang="ro-RO" dirty="0" err="1"/>
+              <a:t>chunk</a:t>
+            </a:r>
+            <a:r>
+              <a:rPr lang="ro-RO" dirty="0"/>
+              <a:t> are un </a:t>
+            </a:r>
+            <a:r>
+              <a:rPr lang="ro-RO" dirty="0" err="1"/>
+              <a:t>mesh</a:t>
+            </a:r>
+            <a:r>
+              <a:rPr lang="ro-RO" dirty="0"/>
+              <a:t> atribuit si un </a:t>
+            </a:r>
+            <a:r>
+              <a:rPr lang="ro-RO" dirty="0" err="1"/>
+              <a:t>collider</a:t>
+            </a:r>
+            <a:r>
+              <a:rPr lang="ro-RO" dirty="0"/>
+              <a:t> format din acel </a:t>
+            </a:r>
+            <a:r>
+              <a:rPr lang="ro-RO" dirty="0" err="1"/>
+              <a:t>mesh</a:t>
+            </a:r>
+            <a:r>
+              <a:rPr lang="ro-RO" dirty="0"/>
+              <a:t>. Astfel vehiculul poate </a:t>
+            </a:r>
+            <a:r>
+              <a:rPr lang="ro-RO" dirty="0" err="1"/>
+              <a:t>interactiona</a:t>
+            </a:r>
+            <a:r>
+              <a:rPr lang="ro-RO" dirty="0"/>
+              <a:t> cu „</a:t>
+            </a:r>
+            <a:r>
+              <a:rPr lang="ro-RO" dirty="0" err="1"/>
+              <a:t>pamantul</a:t>
+            </a:r>
+            <a:r>
+              <a:rPr lang="ro-RO" dirty="0"/>
+              <a:t>”</a:t>
             </a:r>
           </a:p>
         </p:txBody>
@@ -17267,7 +18441,393 @@
     </p:spTree>
     <p:extLst>
       <p:ext uri="{BB962C8B-B14F-4D97-AF65-F5344CB8AC3E}">
-        <p14:creationId xmlns:p14="http://schemas.microsoft.com/office/powerpoint/2010/main" val="2939930866"/>
+        <p14:creationId xmlns:p14="http://schemas.microsoft.com/office/powerpoint/2010/main" val="3430766955"/>
+      </p:ext>
+    </p:extLst>
+  </p:cSld>
+  <p:clrMapOvr>
+    <a:masterClrMapping/>
+  </p:clrMapOvr>
+</p:sld>
+</file>
+
+<file path=ppt/slides/slide9.xml><?xml version="1.0" encoding="utf-8"?>
+<p:sld xmlns:a="http://schemas.openxmlformats.org/drawingml/2006/main" xmlns:r="http://schemas.openxmlformats.org/officeDocument/2006/relationships" xmlns:p="http://schemas.openxmlformats.org/presentationml/2006/main">
+  <p:cSld>
+    <p:spTree>
+      <p:nvGrpSpPr>
+        <p:cNvPr id="1" name=""/>
+        <p:cNvGrpSpPr/>
+        <p:nvPr/>
+      </p:nvGrpSpPr>
+      <p:grpSpPr>
+        <a:xfrm>
+          <a:off x="0" y="0"/>
+          <a:ext cx="0" cy="0"/>
+          <a:chOff x="0" y="0"/>
+          <a:chExt cx="0" cy="0"/>
+        </a:xfrm>
+      </p:grpSpPr>
+      <p:sp>
+        <p:nvSpPr>
+          <p:cNvPr id="3" name="Content Placeholder 2">
+            <a:extLst>
+              <a:ext uri="{FF2B5EF4-FFF2-40B4-BE49-F238E27FC236}">
+                <a16:creationId xmlns:a16="http://schemas.microsoft.com/office/drawing/2014/main" id="{4F202D1F-F155-4AB9-8BDA-20945416580A}"/>
+              </a:ext>
+            </a:extLst>
+          </p:cNvPr>
+          <p:cNvSpPr>
+            <a:spLocks noGrp="1"/>
+          </p:cNvSpPr>
+          <p:nvPr>
+            <p:ph idx="1"/>
+          </p:nvPr>
+        </p:nvSpPr>
+        <p:spPr>
+          <a:xfrm>
+            <a:off x="685801" y="455880"/>
+            <a:ext cx="10131425" cy="3649133"/>
+          </a:xfrm>
+        </p:spPr>
+        <p:txBody>
+          <a:bodyPr>
+            <a:normAutofit fontScale="92500"/>
+          </a:bodyPr>
+          <a:lstStyle/>
+          <a:p>
+            <a:r>
+              <a:rPr lang="ro-RO" dirty="0"/>
+              <a:t>In </a:t>
+            </a:r>
+            <a:r>
+              <a:rPr lang="ro-RO" dirty="0" err="1"/>
+              <a:t>acelasi</a:t>
+            </a:r>
+            <a:r>
+              <a:rPr lang="ro-RO" dirty="0"/>
+              <a:t> algoritm este suprapus un </a:t>
+            </a:r>
+            <a:r>
+              <a:rPr lang="ro-RO" dirty="0" err="1"/>
+              <a:t>engine</a:t>
+            </a:r>
+            <a:r>
+              <a:rPr lang="ro-RO" dirty="0"/>
+              <a:t> de plasare a plantelor in </a:t>
+            </a:r>
+            <a:r>
+              <a:rPr lang="ro-RO" dirty="0" err="1"/>
+              <a:t>pozitii</a:t>
+            </a:r>
+            <a:r>
+              <a:rPr lang="ro-RO" dirty="0"/>
+              <a:t> random.</a:t>
+            </a:r>
+          </a:p>
+          <a:p>
+            <a:r>
+              <a:rPr lang="ro-RO" dirty="0" err="1"/>
+              <a:t>Cateva</a:t>
+            </a:r>
+            <a:r>
+              <a:rPr lang="ro-RO" dirty="0"/>
+              <a:t> variabile </a:t>
+            </a:r>
+            <a:r>
+              <a:rPr lang="ro-RO" dirty="0" err="1"/>
+              <a:t>controleaza</a:t>
+            </a:r>
+            <a:r>
+              <a:rPr lang="ro-RO" dirty="0"/>
+              <a:t> </a:t>
+            </a:r>
+            <a:r>
+              <a:rPr lang="ro-RO" dirty="0" err="1"/>
+              <a:t>compartamenul</a:t>
+            </a:r>
+            <a:r>
+              <a:rPr lang="ro-RO" dirty="0"/>
+              <a:t> algoritmului:</a:t>
+            </a:r>
+          </a:p>
+          <a:p>
+            <a:pPr lvl="1"/>
+            <a:r>
+              <a:rPr lang="ro-RO" dirty="0"/>
+              <a:t>Plante per </a:t>
+            </a:r>
+            <a:r>
+              <a:rPr lang="ro-RO" dirty="0" err="1"/>
+              <a:t>chunk</a:t>
+            </a:r>
+            <a:endParaRPr lang="ro-RO" dirty="0"/>
+          </a:p>
+          <a:p>
+            <a:pPr lvl="1"/>
+            <a:r>
+              <a:rPr lang="ro-RO" dirty="0"/>
+              <a:t>Raza de </a:t>
+            </a:r>
+            <a:r>
+              <a:rPr lang="ro-RO" dirty="0" err="1"/>
+              <a:t>incarcare</a:t>
+            </a:r>
+            <a:r>
+              <a:rPr lang="ro-RO" dirty="0"/>
+              <a:t> a plantelor</a:t>
+            </a:r>
+          </a:p>
+          <a:p>
+            <a:r>
+              <a:rPr lang="ro-RO" dirty="0"/>
+              <a:t>Implementare</a:t>
+            </a:r>
+          </a:p>
+          <a:p>
+            <a:pPr lvl="1"/>
+            <a:r>
+              <a:rPr lang="ro-RO" dirty="0"/>
+              <a:t>Algoritmul </a:t>
+            </a:r>
+            <a:r>
+              <a:rPr lang="ro-RO" dirty="0" err="1"/>
+              <a:t>foloseste</a:t>
+            </a:r>
+            <a:r>
+              <a:rPr lang="ro-RO" dirty="0"/>
+              <a:t> Ray </a:t>
+            </a:r>
+            <a:r>
+              <a:rPr lang="ro-RO" dirty="0" err="1"/>
+              <a:t>Tracing</a:t>
+            </a:r>
+            <a:endParaRPr lang="ro-RO" dirty="0"/>
+          </a:p>
+          <a:p>
+            <a:pPr lvl="1"/>
+            <a:r>
+              <a:rPr lang="ro-RO" dirty="0"/>
+              <a:t>Vehiculul are atribuit un </a:t>
+            </a:r>
+            <a:r>
+              <a:rPr lang="ro-RO" dirty="0" err="1"/>
+              <a:t>tag</a:t>
+            </a:r>
+            <a:r>
+              <a:rPr lang="ro-RO" dirty="0"/>
+              <a:t> special</a:t>
+            </a:r>
+          </a:p>
+          <a:p>
+            <a:pPr lvl="1"/>
+            <a:r>
+              <a:rPr lang="ro-RO" dirty="0"/>
+              <a:t>In </a:t>
+            </a:r>
+            <a:r>
+              <a:rPr lang="ro-RO" dirty="0" err="1"/>
+              <a:t>functie</a:t>
+            </a:r>
+            <a:r>
+              <a:rPr lang="ro-RO" dirty="0"/>
+              <a:t> de parametrii </a:t>
+            </a:r>
+            <a:r>
+              <a:rPr lang="ro-RO" dirty="0" err="1"/>
+              <a:t>setati</a:t>
+            </a:r>
+            <a:r>
+              <a:rPr lang="ro-RO" dirty="0"/>
+              <a:t> si pentru fiecare </a:t>
+            </a:r>
+            <a:r>
+              <a:rPr lang="ro-RO" dirty="0" err="1"/>
+              <a:t>chunk</a:t>
+            </a:r>
+            <a:r>
+              <a:rPr lang="ro-RO" dirty="0"/>
+              <a:t> apropiat sunt trimise raze de la </a:t>
+            </a:r>
+            <a:r>
+              <a:rPr lang="ro-RO" dirty="0" err="1"/>
+              <a:t>inaltimea</a:t>
+            </a:r>
+            <a:r>
+              <a:rPr lang="ro-RO" dirty="0"/>
+              <a:t> maxima a unui </a:t>
+            </a:r>
+            <a:r>
+              <a:rPr lang="ro-RO" dirty="0" err="1"/>
+              <a:t>chunk</a:t>
+            </a:r>
+            <a:r>
+              <a:rPr lang="ro-RO" dirty="0"/>
+              <a:t> in jos. La vectorul </a:t>
+            </a:r>
+            <a:r>
+              <a:rPr lang="ro-RO" dirty="0" err="1"/>
+              <a:t>directie</a:t>
+            </a:r>
+            <a:r>
+              <a:rPr lang="ro-RO" dirty="0"/>
+              <a:t> „jos” este </a:t>
+            </a:r>
+            <a:r>
+              <a:rPr lang="ro-RO" dirty="0" err="1"/>
+              <a:t>adaugat</a:t>
+            </a:r>
+            <a:r>
+              <a:rPr lang="ro-RO" dirty="0"/>
+              <a:t> un vector</a:t>
+            </a:r>
+            <a:r>
+              <a:rPr lang="en-US" dirty="0"/>
+              <a:t> aleator in </a:t>
+            </a:r>
+            <a:r>
+              <a:rPr lang="en-US" dirty="0" err="1"/>
+              <a:t>asa</a:t>
+            </a:r>
+            <a:r>
+              <a:rPr lang="en-US" dirty="0"/>
+              <a:t> </a:t>
+            </a:r>
+            <a:r>
+              <a:rPr lang="en-US" dirty="0" err="1"/>
+              <a:t>fel</a:t>
+            </a:r>
+            <a:r>
+              <a:rPr lang="en-US" dirty="0"/>
+              <a:t> </a:t>
+            </a:r>
+            <a:r>
+              <a:rPr lang="en-US" dirty="0" err="1"/>
+              <a:t>incat</a:t>
+            </a:r>
+            <a:r>
+              <a:rPr lang="en-US" dirty="0"/>
+              <a:t> </a:t>
+            </a:r>
+            <a:r>
+              <a:rPr lang="en-US" dirty="0" err="1"/>
+              <a:t>este</a:t>
+            </a:r>
+            <a:r>
+              <a:rPr lang="en-US" dirty="0"/>
+              <a:t> </a:t>
+            </a:r>
+            <a:r>
+              <a:rPr lang="en-US" dirty="0" err="1"/>
+              <a:t>pastrata</a:t>
+            </a:r>
+            <a:r>
+              <a:rPr lang="en-US" dirty="0"/>
+              <a:t> </a:t>
+            </a:r>
+            <a:r>
+              <a:rPr lang="en-US" dirty="0" err="1"/>
+              <a:t>directia</a:t>
+            </a:r>
+            <a:r>
+              <a:rPr lang="en-US" dirty="0"/>
+              <a:t> </a:t>
+            </a:r>
+            <a:r>
+              <a:rPr lang="en-US" dirty="0" err="1"/>
+              <a:t>generala</a:t>
+            </a:r>
+            <a:r>
+              <a:rPr lang="en-US" dirty="0"/>
+              <a:t> in </a:t>
+            </a:r>
+            <a:r>
+              <a:rPr lang="en-US" dirty="0" err="1"/>
+              <a:t>jos</a:t>
+            </a:r>
+            <a:endParaRPr lang="en-US" dirty="0"/>
+          </a:p>
+          <a:p>
+            <a:pPr lvl="1"/>
+            <a:r>
+              <a:rPr lang="en-US" dirty="0"/>
+              <a:t>Se </a:t>
+            </a:r>
+            <a:r>
+              <a:rPr lang="en-US" dirty="0" err="1"/>
+              <a:t>evita</a:t>
+            </a:r>
+            <a:r>
+              <a:rPr lang="en-US" dirty="0"/>
+              <a:t> </a:t>
+            </a:r>
+            <a:r>
+              <a:rPr lang="en-US" dirty="0" err="1"/>
+              <a:t>punctul</a:t>
+            </a:r>
+            <a:r>
+              <a:rPr lang="en-US" dirty="0"/>
+              <a:t> </a:t>
+            </a:r>
+            <a:r>
+              <a:rPr lang="en-US" dirty="0" err="1"/>
+              <a:t>calculat</a:t>
+            </a:r>
+            <a:r>
+              <a:rPr lang="en-US"/>
+              <a:t> daca</a:t>
+            </a:r>
+            <a:r>
+              <a:rPr lang="en-US" dirty="0"/>
+              <a:t> </a:t>
+            </a:r>
+            <a:r>
+              <a:rPr lang="en-US" dirty="0" err="1"/>
+              <a:t>suprafata</a:t>
+            </a:r>
+            <a:r>
+              <a:rPr lang="en-US" dirty="0"/>
+              <a:t> </a:t>
+            </a:r>
+            <a:r>
+              <a:rPr lang="en-US" dirty="0" err="1"/>
+              <a:t>lovita</a:t>
+            </a:r>
+            <a:r>
+              <a:rPr lang="en-US" dirty="0"/>
+              <a:t> </a:t>
+            </a:r>
+            <a:r>
+              <a:rPr lang="en-US" dirty="0" err="1"/>
+              <a:t>este</a:t>
+            </a:r>
+            <a:r>
+              <a:rPr lang="en-US" dirty="0"/>
+              <a:t> </a:t>
+            </a:r>
+            <a:r>
+              <a:rPr lang="en-US" dirty="0" err="1"/>
+              <a:t>cea</a:t>
+            </a:r>
+            <a:r>
+              <a:rPr lang="en-US" dirty="0"/>
+              <a:t> a </a:t>
+            </a:r>
+            <a:r>
+              <a:rPr lang="en-US" dirty="0" err="1"/>
+              <a:t>vehiculului</a:t>
+            </a:r>
+            <a:endParaRPr lang="ro-RO" dirty="0"/>
+          </a:p>
+          <a:p>
+            <a:endParaRPr lang="ro-RO" dirty="0"/>
+          </a:p>
+        </p:txBody>
+      </p:sp>
+    </p:spTree>
+    <p:extLst>
+      <p:ext uri="{BB962C8B-B14F-4D97-AF65-F5344CB8AC3E}">
+        <p14:creationId xmlns:p14="http://schemas.microsoft.com/office/powerpoint/2010/main" val="2214334214"/>
       </p:ext>
     </p:extLst>
   </p:cSld>
@@ -18117,12 +19677,12 @@
 </file>
 
 <file path=customXml/item1.xml><?xml version="1.0" encoding="utf-8"?>
-<p:properties xmlns:p="http://schemas.microsoft.com/office/2006/metadata/properties" xmlns:xsi="http://www.w3.org/2001/XMLSchema-instance" xmlns:pc="http://schemas.microsoft.com/office/infopath/2007/PartnerControls">
-  <documentManagement>
-    <MediaServiceKeyPoints xmlns="71af3243-3dd4-4a8d-8c0d-dd76da1f02a5" xsi:nil="true"/>
-    <Status xmlns="71af3243-3dd4-4a8d-8c0d-dd76da1f02a5">Not started</Status>
-  </documentManagement>
-</p:properties>
+<?mso-contentType ?>
+<FormTemplates xmlns="http://schemas.microsoft.com/sharepoint/v3/contenttype/forms">
+  <Display>DocumentLibraryForm</Display>
+  <Edit>DocumentLibraryForm</Edit>
+  <New>DocumentLibraryForm</New>
+</FormTemplates>
 </file>
 
 <file path=customXml/item2.xml><?xml version="1.0" encoding="utf-8"?>
@@ -18347,27 +19907,18 @@
 </file>
 
 <file path=customXml/item3.xml><?xml version="1.0" encoding="utf-8"?>
-<?mso-contentType ?>
-<FormTemplates xmlns="http://schemas.microsoft.com/sharepoint/v3/contenttype/forms">
-  <Display>DocumentLibraryForm</Display>
-  <Edit>DocumentLibraryForm</Edit>
-  <New>DocumentLibraryForm</New>
-</FormTemplates>
+<p:properties xmlns:p="http://schemas.microsoft.com/office/2006/metadata/properties" xmlns:xsi="http://www.w3.org/2001/XMLSchema-instance" xmlns:pc="http://schemas.microsoft.com/office/infopath/2007/PartnerControls">
+  <documentManagement>
+    <MediaServiceKeyPoints xmlns="71af3243-3dd4-4a8d-8c0d-dd76da1f02a5" xsi:nil="true"/>
+    <Status xmlns="71af3243-3dd4-4a8d-8c0d-dd76da1f02a5">Not started</Status>
+  </documentManagement>
+</p:properties>
 </file>
 
 <file path=customXml/itemProps1.xml><?xml version="1.0" encoding="utf-8"?>
-<ds:datastoreItem xmlns:ds="http://schemas.openxmlformats.org/officeDocument/2006/customXml" ds:itemID="{4415B3C4-7FB6-414C-8C24-8862C0E6C9F3}">
+<ds:datastoreItem xmlns:ds="http://schemas.openxmlformats.org/officeDocument/2006/customXml" ds:itemID="{CE12C2FA-3740-4055-BA8A-74A1458F4A51}">
   <ds:schemaRefs>
-    <ds:schemaRef ds:uri="http://www.w3.org/XML/1998/namespace"/>
-    <ds:schemaRef ds:uri="http://purl.org/dc/elements/1.1/"/>
-    <ds:schemaRef ds:uri="http://schemas.microsoft.com/office/infopath/2007/PartnerControls"/>
-    <ds:schemaRef ds:uri="http://purl.org/dc/dcmitype/"/>
-    <ds:schemaRef ds:uri="16c05727-aa75-4e4a-9b5f-8a80a1165891"/>
-    <ds:schemaRef ds:uri="http://schemas.microsoft.com/office/2006/documentManagement/types"/>
-    <ds:schemaRef ds:uri="71af3243-3dd4-4a8d-8c0d-dd76da1f02a5"/>
-    <ds:schemaRef ds:uri="http://schemas.openxmlformats.org/package/2006/metadata/core-properties"/>
-    <ds:schemaRef ds:uri="http://schemas.microsoft.com/office/2006/metadata/properties"/>
-    <ds:schemaRef ds:uri="http://purl.org/dc/terms/"/>
+    <ds:schemaRef ds:uri="http://schemas.microsoft.com/sharepoint/v3/contenttype/forms"/>
   </ds:schemaRefs>
 </ds:datastoreItem>
 </file>
@@ -18392,9 +19943,18 @@
 </file>
 
 <file path=customXml/itemProps3.xml><?xml version="1.0" encoding="utf-8"?>
-<ds:datastoreItem xmlns:ds="http://schemas.openxmlformats.org/officeDocument/2006/customXml" ds:itemID="{CE12C2FA-3740-4055-BA8A-74A1458F4A51}">
+<ds:datastoreItem xmlns:ds="http://schemas.openxmlformats.org/officeDocument/2006/customXml" ds:itemID="{4415B3C4-7FB6-414C-8C24-8862C0E6C9F3}">
   <ds:schemaRefs>
-    <ds:schemaRef ds:uri="http://schemas.microsoft.com/sharepoint/v3/contenttype/forms"/>
+    <ds:schemaRef ds:uri="http://www.w3.org/XML/1998/namespace"/>
+    <ds:schemaRef ds:uri="http://purl.org/dc/elements/1.1/"/>
+    <ds:schemaRef ds:uri="http://schemas.microsoft.com/office/infopath/2007/PartnerControls"/>
+    <ds:schemaRef ds:uri="http://purl.org/dc/dcmitype/"/>
+    <ds:schemaRef ds:uri="16c05727-aa75-4e4a-9b5f-8a80a1165891"/>
+    <ds:schemaRef ds:uri="http://schemas.microsoft.com/office/2006/documentManagement/types"/>
+    <ds:schemaRef ds:uri="71af3243-3dd4-4a8d-8c0d-dd76da1f02a5"/>
+    <ds:schemaRef ds:uri="http://schemas.openxmlformats.org/package/2006/metadata/core-properties"/>
+    <ds:schemaRef ds:uri="http://schemas.microsoft.com/office/2006/metadata/properties"/>
+    <ds:schemaRef ds:uri="http://purl.org/dc/terms/"/>
   </ds:schemaRefs>
 </ds:datastoreItem>
 </file>
</xml_diff>

<commit_message>
Improved Verlet gizmos; Updated documentation
</commit_message>
<xml_diff>
--- a/Prezentare/OceanExploration.pptx
+++ b/Prezentare/OceanExploration.pptx
@@ -5,10 +5,10 @@
     <p:sldMasterId id="2147483744" r:id="rId4"/>
   </p:sldMasterIdLst>
   <p:notesMasterIdLst>
-    <p:notesMasterId r:id="rId17"/>
+    <p:notesMasterId r:id="rId18"/>
   </p:notesMasterIdLst>
   <p:handoutMasterIdLst>
-    <p:handoutMasterId r:id="rId18"/>
+    <p:handoutMasterId r:id="rId19"/>
   </p:handoutMasterIdLst>
   <p:sldIdLst>
     <p:sldId id="256" r:id="rId5"/>
@@ -19,10 +19,11 @@
     <p:sldId id="277" r:id="rId10"/>
     <p:sldId id="278" r:id="rId11"/>
     <p:sldId id="281" r:id="rId12"/>
-    <p:sldId id="279" r:id="rId13"/>
-    <p:sldId id="280" r:id="rId14"/>
-    <p:sldId id="264" r:id="rId15"/>
-    <p:sldId id="274" r:id="rId16"/>
+    <p:sldId id="282" r:id="rId13"/>
+    <p:sldId id="279" r:id="rId14"/>
+    <p:sldId id="280" r:id="rId15"/>
+    <p:sldId id="264" r:id="rId16"/>
+    <p:sldId id="274" r:id="rId17"/>
   </p:sldIdLst>
   <p:sldSz cx="12192000" cy="6858000"/>
   <p:notesSz cx="6858000" cy="9144000"/>
@@ -998,7 +999,7 @@
           <a:p>
             <a:fld id="{F3544625-0ADF-4414-89A2-9E135F0C849F}" type="slidenum">
               <a:rPr lang="en-US" smtClean="0"/>
-              <a:t>11</a:t>
+              <a:t>12</a:t>
             </a:fld>
             <a:endParaRPr lang="en-US" dirty="0"/>
           </a:p>
@@ -1082,7 +1083,7 @@
           <a:p>
             <a:fld id="{F3544625-0ADF-4414-89A2-9E135F0C849F}" type="slidenum">
               <a:rPr lang="en-US" smtClean="0"/>
-              <a:t>12</a:t>
+              <a:t>13</a:t>
             </a:fld>
             <a:endParaRPr lang="en-US" dirty="0"/>
           </a:p>
@@ -7423,6 +7424,297 @@
       </p:grpSpPr>
       <p:sp>
         <p:nvSpPr>
+          <p:cNvPr id="2" name="Title 1">
+            <a:extLst>
+              <a:ext uri="{FF2B5EF4-FFF2-40B4-BE49-F238E27FC236}">
+                <a16:creationId xmlns:a16="http://schemas.microsoft.com/office/drawing/2014/main" id="{D22E4C12-7659-4591-A8B8-EE87B56DD8C6}"/>
+              </a:ext>
+            </a:extLst>
+          </p:cNvPr>
+          <p:cNvSpPr>
+            <a:spLocks noGrp="1"/>
+          </p:cNvSpPr>
+          <p:nvPr>
+            <p:ph type="title"/>
+          </p:nvPr>
+        </p:nvSpPr>
+        <p:spPr/>
+        <p:txBody>
+          <a:bodyPr/>
+          <a:lstStyle/>
+          <a:p>
+            <a:r>
+              <a:rPr lang="ro-RO" dirty="0" err="1"/>
+              <a:t>Terrain</a:t>
+            </a:r>
+            <a:r>
+              <a:rPr lang="ro-RO" dirty="0"/>
+              <a:t> generator</a:t>
+            </a:r>
+          </a:p>
+        </p:txBody>
+      </p:sp>
+      <p:sp>
+        <p:nvSpPr>
+          <p:cNvPr id="3" name="Content Placeholder 2">
+            <a:extLst>
+              <a:ext uri="{FF2B5EF4-FFF2-40B4-BE49-F238E27FC236}">
+                <a16:creationId xmlns:a16="http://schemas.microsoft.com/office/drawing/2014/main" id="{09F0C14C-5BF3-45BB-9621-29B8D4421DF0}"/>
+              </a:ext>
+            </a:extLst>
+          </p:cNvPr>
+          <p:cNvSpPr>
+            <a:spLocks noGrp="1"/>
+          </p:cNvSpPr>
+          <p:nvPr>
+            <p:ph idx="1"/>
+          </p:nvPr>
+        </p:nvSpPr>
+        <p:spPr/>
+        <p:txBody>
+          <a:bodyPr>
+            <a:normAutofit/>
+          </a:bodyPr>
+          <a:lstStyle/>
+          <a:p>
+            <a:r>
+              <a:rPr lang="ro-RO" dirty="0"/>
+              <a:t>Algoritmul de </a:t>
+            </a:r>
+            <a:r>
+              <a:rPr lang="ro-RO" dirty="0" err="1"/>
+              <a:t>Marching</a:t>
+            </a:r>
+            <a:r>
+              <a:rPr lang="ro-RO" dirty="0"/>
+              <a:t> </a:t>
+            </a:r>
+            <a:r>
+              <a:rPr lang="ro-RO" dirty="0" err="1"/>
+              <a:t>Cubes</a:t>
+            </a:r>
+            <a:r>
+              <a:rPr lang="ro-RO" dirty="0"/>
+              <a:t> este utilizat </a:t>
+            </a:r>
+            <a:r>
+              <a:rPr lang="ro-RO" dirty="0" err="1"/>
+              <a:t>intr-o</a:t>
+            </a:r>
+            <a:r>
+              <a:rPr lang="ro-RO" dirty="0"/>
+              <a:t> clasa de generare a </a:t>
+            </a:r>
+            <a:r>
+              <a:rPr lang="ro-RO" dirty="0" err="1"/>
+              <a:t>chunk</a:t>
+            </a:r>
+            <a:r>
+              <a:rPr lang="ro-RO" dirty="0"/>
+              <a:t>-urilor pentru teren.</a:t>
+            </a:r>
+          </a:p>
+          <a:p>
+            <a:r>
+              <a:rPr lang="ro-RO" dirty="0"/>
+              <a:t>O variabila </a:t>
+            </a:r>
+            <a:r>
+              <a:rPr lang="ro-RO" dirty="0" err="1"/>
+              <a:t>controleaza</a:t>
+            </a:r>
+            <a:r>
+              <a:rPr lang="ro-RO" dirty="0"/>
+              <a:t> step </a:t>
+            </a:r>
+            <a:r>
+              <a:rPr lang="ro-RO" dirty="0" err="1"/>
+              <a:t>size-ul</a:t>
+            </a:r>
+            <a:r>
+              <a:rPr lang="ro-RO" dirty="0"/>
+              <a:t> terenului – folosit pentru aspectul de terasare</a:t>
+            </a:r>
+          </a:p>
+          <a:p>
+            <a:r>
+              <a:rPr lang="ro-RO" dirty="0"/>
+              <a:t>Alte variabile </a:t>
+            </a:r>
+            <a:r>
+              <a:rPr lang="ro-RO" dirty="0" err="1"/>
+              <a:t>controleaza</a:t>
+            </a:r>
+            <a:r>
+              <a:rPr lang="ro-RO" dirty="0"/>
+              <a:t>:</a:t>
+            </a:r>
+          </a:p>
+          <a:p>
+            <a:pPr lvl="1"/>
+            <a:r>
+              <a:rPr lang="ro-RO" dirty="0"/>
+              <a:t>Lungimea bazei unui </a:t>
+            </a:r>
+            <a:r>
+              <a:rPr lang="ro-RO" dirty="0" err="1"/>
+              <a:t>chunk</a:t>
+            </a:r>
+            <a:endParaRPr lang="ro-RO" dirty="0"/>
+          </a:p>
+          <a:p>
+            <a:pPr lvl="1"/>
+            <a:r>
+              <a:rPr lang="ro-RO" dirty="0" err="1"/>
+              <a:t>Inaltimea</a:t>
+            </a:r>
+            <a:endParaRPr lang="ro-RO" dirty="0"/>
+          </a:p>
+          <a:p>
+            <a:pPr lvl="1"/>
+            <a:r>
+              <a:rPr lang="ro-RO" dirty="0"/>
+              <a:t>Raza de </a:t>
+            </a:r>
+            <a:r>
+              <a:rPr lang="ro-RO" dirty="0" err="1"/>
+              <a:t>incarcare</a:t>
+            </a:r>
+            <a:r>
+              <a:rPr lang="ro-RO" dirty="0"/>
+              <a:t> (se face </a:t>
+            </a:r>
+            <a:r>
+              <a:rPr lang="ro-RO" dirty="0" err="1"/>
+              <a:t>intr</a:t>
+            </a:r>
+            <a:r>
+              <a:rPr lang="ro-RO" dirty="0"/>
+              <a:t>-un cerc)</a:t>
+            </a:r>
+          </a:p>
+          <a:p>
+            <a:r>
+              <a:rPr lang="ro-RO" dirty="0" err="1"/>
+              <a:t>Chunkurile</a:t>
+            </a:r>
+            <a:r>
+              <a:rPr lang="ro-RO" dirty="0"/>
+              <a:t> nu sunt distruse in </a:t>
+            </a:r>
+            <a:r>
+              <a:rPr lang="ro-RO" dirty="0" err="1"/>
+              <a:t>intregime</a:t>
+            </a:r>
+            <a:r>
+              <a:rPr lang="ro-RO" dirty="0"/>
+              <a:t> ci la dezactivare sunt salvate </a:t>
+            </a:r>
+            <a:r>
+              <a:rPr lang="ro-RO" dirty="0" err="1"/>
+              <a:t>intr</a:t>
+            </a:r>
+            <a:r>
+              <a:rPr lang="ro-RO" dirty="0"/>
+              <a:t>-un cache de unde vor fi </a:t>
+            </a:r>
+            <a:r>
+              <a:rPr lang="ro-RO" dirty="0" err="1"/>
+              <a:t>reincarcate</a:t>
+            </a:r>
+            <a:r>
+              <a:rPr lang="ro-RO" dirty="0"/>
+              <a:t> la comanda.</a:t>
+            </a:r>
+          </a:p>
+          <a:p>
+            <a:r>
+              <a:rPr lang="ro-RO" dirty="0"/>
+              <a:t>Fiecare </a:t>
+            </a:r>
+            <a:r>
+              <a:rPr lang="ro-RO" dirty="0" err="1"/>
+              <a:t>chunk</a:t>
+            </a:r>
+            <a:r>
+              <a:rPr lang="ro-RO" dirty="0"/>
+              <a:t> are un </a:t>
+            </a:r>
+            <a:r>
+              <a:rPr lang="ro-RO" dirty="0" err="1"/>
+              <a:t>mesh</a:t>
+            </a:r>
+            <a:r>
+              <a:rPr lang="ro-RO" dirty="0"/>
+              <a:t> atribuit si un </a:t>
+            </a:r>
+            <a:r>
+              <a:rPr lang="ro-RO" dirty="0" err="1"/>
+              <a:t>collider</a:t>
+            </a:r>
+            <a:r>
+              <a:rPr lang="ro-RO" dirty="0"/>
+              <a:t> format din acel </a:t>
+            </a:r>
+            <a:r>
+              <a:rPr lang="ro-RO" dirty="0" err="1"/>
+              <a:t>mesh</a:t>
+            </a:r>
+            <a:r>
+              <a:rPr lang="ro-RO" dirty="0"/>
+              <a:t>. Astfel vehiculul poate </a:t>
+            </a:r>
+            <a:r>
+              <a:rPr lang="ro-RO" dirty="0" err="1"/>
+              <a:t>interactiona</a:t>
+            </a:r>
+            <a:r>
+              <a:rPr lang="ro-RO" dirty="0"/>
+              <a:t> cu „</a:t>
+            </a:r>
+            <a:r>
+              <a:rPr lang="ro-RO" dirty="0" err="1"/>
+              <a:t>pamantul</a:t>
+            </a:r>
+            <a:r>
+              <a:rPr lang="ro-RO" dirty="0"/>
+              <a:t>”</a:t>
+            </a:r>
+          </a:p>
+        </p:txBody>
+      </p:sp>
+    </p:spTree>
+    <p:extLst>
+      <p:ext uri="{BB962C8B-B14F-4D97-AF65-F5344CB8AC3E}">
+        <p14:creationId xmlns:p14="http://schemas.microsoft.com/office/powerpoint/2010/main" val="3430766955"/>
+      </p:ext>
+    </p:extLst>
+  </p:cSld>
+  <p:clrMapOvr>
+    <a:masterClrMapping/>
+  </p:clrMapOvr>
+</p:sld>
+</file>
+
+<file path=ppt/slides/slide11.xml><?xml version="1.0" encoding="utf-8"?>
+<p:sld xmlns:a="http://schemas.openxmlformats.org/drawingml/2006/main" xmlns:r="http://schemas.openxmlformats.org/officeDocument/2006/relationships" xmlns:p="http://schemas.openxmlformats.org/presentationml/2006/main">
+  <p:cSld>
+    <p:spTree>
+      <p:nvGrpSpPr>
+        <p:cNvPr id="1" name=""/>
+        <p:cNvGrpSpPr/>
+        <p:nvPr/>
+      </p:nvGrpSpPr>
+      <p:grpSpPr>
+        <a:xfrm>
+          <a:off x="0" y="0"/>
+          <a:ext cx="0" cy="0"/>
+          <a:chOff x="0" y="0"/>
+          <a:chExt cx="0" cy="0"/>
+        </a:xfrm>
+      </p:grpSpPr>
+      <p:sp>
+        <p:nvSpPr>
           <p:cNvPr id="3" name="Content Placeholder 2">
             <a:extLst>
               <a:ext uri="{FF2B5EF4-FFF2-40B4-BE49-F238E27FC236}">
@@ -7794,7 +8086,7 @@
 </p:sld>
 </file>
 
-<file path=ppt/slides/slide11.xml><?xml version="1.0" encoding="utf-8"?>
+<file path=ppt/slides/slide12.xml><?xml version="1.0" encoding="utf-8"?>
 <p:sld xmlns:a="http://schemas.openxmlformats.org/drawingml/2006/main" xmlns:r="http://schemas.openxmlformats.org/officeDocument/2006/relationships" xmlns:p="http://schemas.openxmlformats.org/presentationml/2006/main">
   <p:cSld>
     <p:spTree>
@@ -8084,7 +8376,7 @@
 </p:sld>
 </file>
 
-<file path=ppt/slides/slide12.xml><?xml version="1.0" encoding="utf-8"?>
+<file path=ppt/slides/slide13.xml><?xml version="1.0" encoding="utf-8"?>
 <p:sld xmlns:a="http://schemas.openxmlformats.org/drawingml/2006/main" xmlns:r="http://schemas.openxmlformats.org/officeDocument/2006/relationships" xmlns:p="http://schemas.openxmlformats.org/presentationml/2006/main">
   <p:cSld>
     <p:spTree>
@@ -18999,7 +19291,18 @@
                 </a:r>
               </a:p>
               <a:p>
-                <a:endParaRPr lang="ro-RO" dirty="0"/>
+                <a:r>
+                  <a:rPr lang="ro-RO" dirty="0"/>
+                  <a:t>Pentru a simula cat mai bine o planta </a:t>
+                </a:r>
+                <a:r>
+                  <a:rPr lang="ro-RO" dirty="0" err="1"/>
+                  <a:t>rasfirata</a:t>
+                </a:r>
+                <a:r>
+                  <a:rPr lang="ro-RO" dirty="0"/>
+                  <a:t> este introdus un alt parametru </a:t>
+                </a:r>
               </a:p>
             </p:txBody>
           </p:sp>
@@ -19074,271 +19377,85 @@
           <a:chExt cx="0" cy="0"/>
         </a:xfrm>
       </p:grpSpPr>
-      <p:sp>
-        <p:nvSpPr>
-          <p:cNvPr id="2" name="Title 1">
+      <p:pic>
+        <p:nvPicPr>
+          <p:cNvPr id="4" name="Content Placeholder 3">
             <a:extLst>
               <a:ext uri="{FF2B5EF4-FFF2-40B4-BE49-F238E27FC236}">
-                <a16:creationId xmlns:a16="http://schemas.microsoft.com/office/drawing/2014/main" id="{D22E4C12-7659-4591-A8B8-EE87B56DD8C6}"/>
+                <a16:creationId xmlns:a16="http://schemas.microsoft.com/office/drawing/2014/main" id="{227C1ADA-543B-4199-9DDE-676233BE3702}"/>
               </a:ext>
             </a:extLst>
           </p:cNvPr>
-          <p:cNvSpPr>
-            <a:spLocks noGrp="1"/>
-          </p:cNvSpPr>
+          <p:cNvPicPr>
+            <a:picLocks noGrp="1" noChangeAspect="1"/>
+          </p:cNvPicPr>
           <p:nvPr>
-            <p:ph type="title"/>
+            <p:ph idx="1"/>
           </p:nvPr>
-        </p:nvSpPr>
-        <p:spPr/>
-        <p:txBody>
-          <a:bodyPr/>
-          <a:lstStyle/>
-          <a:p>
-            <a:r>
-              <a:rPr lang="ro-RO" dirty="0" err="1"/>
-              <a:t>Terrain</a:t>
-            </a:r>
-            <a:r>
-              <a:rPr lang="ro-RO" dirty="0"/>
-              <a:t> generator</a:t>
-            </a:r>
-          </a:p>
-        </p:txBody>
-      </p:sp>
-      <p:sp>
-        <p:nvSpPr>
-          <p:cNvPr id="3" name="Content Placeholder 2">
+        </p:nvPicPr>
+        <p:blipFill>
+          <a:blip r:embed="rId2"/>
+          <a:stretch>
+            <a:fillRect/>
+          </a:stretch>
+        </p:blipFill>
+        <p:spPr>
+          <a:xfrm>
+            <a:off x="511285" y="376579"/>
+            <a:ext cx="5855866" cy="6104841"/>
+          </a:xfrm>
+          <a:prstGeom prst="rect">
+            <a:avLst/>
+          </a:prstGeom>
+        </p:spPr>
+      </p:pic>
+      <p:pic>
+        <p:nvPicPr>
+          <p:cNvPr id="7" name="Picture 6">
             <a:extLst>
               <a:ext uri="{FF2B5EF4-FFF2-40B4-BE49-F238E27FC236}">
-                <a16:creationId xmlns:a16="http://schemas.microsoft.com/office/drawing/2014/main" id="{09F0C14C-5BF3-45BB-9621-29B8D4421DF0}"/>
+                <a16:creationId xmlns:a16="http://schemas.microsoft.com/office/drawing/2014/main" id="{AC1F7AE7-1610-45C8-98BF-8AD24746A8F9}"/>
               </a:ext>
             </a:extLst>
           </p:cNvPr>
-          <p:cNvSpPr>
-            <a:spLocks noGrp="1"/>
-          </p:cNvSpPr>
-          <p:nvPr>
-            <p:ph idx="1"/>
-          </p:nvPr>
-        </p:nvSpPr>
-        <p:spPr/>
-        <p:txBody>
-          <a:bodyPr>
-            <a:normAutofit/>
-          </a:bodyPr>
-          <a:lstStyle/>
-          <a:p>
-            <a:r>
-              <a:rPr lang="ro-RO" dirty="0"/>
-              <a:t>Algoritmul de </a:t>
-            </a:r>
-            <a:r>
-              <a:rPr lang="ro-RO" dirty="0" err="1"/>
-              <a:t>Marching</a:t>
-            </a:r>
-            <a:r>
-              <a:rPr lang="ro-RO" dirty="0"/>
-              <a:t> </a:t>
-            </a:r>
-            <a:r>
-              <a:rPr lang="ro-RO" dirty="0" err="1"/>
-              <a:t>Cubes</a:t>
-            </a:r>
-            <a:r>
-              <a:rPr lang="ro-RO" dirty="0"/>
-              <a:t> este utilizat </a:t>
-            </a:r>
-            <a:r>
-              <a:rPr lang="ro-RO" dirty="0" err="1"/>
-              <a:t>intr-o</a:t>
-            </a:r>
-            <a:r>
-              <a:rPr lang="ro-RO" dirty="0"/>
-              <a:t> clasa de generare a </a:t>
-            </a:r>
-            <a:r>
-              <a:rPr lang="ro-RO" dirty="0" err="1"/>
-              <a:t>chunk</a:t>
-            </a:r>
-            <a:r>
-              <a:rPr lang="ro-RO" dirty="0"/>
-              <a:t>-urilor pentru teren.</a:t>
-            </a:r>
-          </a:p>
-          <a:p>
-            <a:r>
-              <a:rPr lang="ro-RO" dirty="0"/>
-              <a:t>O variabila </a:t>
-            </a:r>
-            <a:r>
-              <a:rPr lang="ro-RO" dirty="0" err="1"/>
-              <a:t>controleaza</a:t>
-            </a:r>
-            <a:r>
-              <a:rPr lang="ro-RO" dirty="0"/>
-              <a:t> step </a:t>
-            </a:r>
-            <a:r>
-              <a:rPr lang="ro-RO" dirty="0" err="1"/>
-              <a:t>size-ul</a:t>
-            </a:r>
-            <a:r>
-              <a:rPr lang="ro-RO" dirty="0"/>
-              <a:t> terenului – folosit pentru aspectul de terasare</a:t>
-            </a:r>
-          </a:p>
-          <a:p>
-            <a:r>
-              <a:rPr lang="ro-RO" dirty="0"/>
-              <a:t>Alte variabile </a:t>
-            </a:r>
-            <a:r>
-              <a:rPr lang="ro-RO" dirty="0" err="1"/>
-              <a:t>controleaza</a:t>
-            </a:r>
-            <a:r>
-              <a:rPr lang="ro-RO" dirty="0"/>
-              <a:t>:</a:t>
-            </a:r>
-          </a:p>
-          <a:p>
-            <a:pPr lvl="1"/>
-            <a:r>
-              <a:rPr lang="ro-RO" dirty="0"/>
-              <a:t>Lungimea bazei unui </a:t>
-            </a:r>
-            <a:r>
-              <a:rPr lang="ro-RO" dirty="0" err="1"/>
-              <a:t>chunk</a:t>
-            </a:r>
-            <a:endParaRPr lang="ro-RO" dirty="0"/>
-          </a:p>
-          <a:p>
-            <a:pPr lvl="1"/>
-            <a:r>
-              <a:rPr lang="ro-RO" dirty="0" err="1"/>
-              <a:t>Inaltimea</a:t>
-            </a:r>
-            <a:endParaRPr lang="ro-RO" dirty="0"/>
-          </a:p>
-          <a:p>
-            <a:pPr lvl="1"/>
-            <a:r>
-              <a:rPr lang="ro-RO" dirty="0"/>
-              <a:t>Raza de </a:t>
-            </a:r>
-            <a:r>
-              <a:rPr lang="ro-RO" dirty="0" err="1"/>
-              <a:t>incarcare</a:t>
-            </a:r>
-            <a:r>
-              <a:rPr lang="ro-RO" dirty="0"/>
-              <a:t> (se face </a:t>
-            </a:r>
-            <a:r>
-              <a:rPr lang="ro-RO" dirty="0" err="1"/>
-              <a:t>intr</a:t>
-            </a:r>
-            <a:r>
-              <a:rPr lang="ro-RO" dirty="0"/>
-              <a:t>-un cerc)</a:t>
-            </a:r>
-          </a:p>
-          <a:p>
-            <a:r>
-              <a:rPr lang="ro-RO" dirty="0" err="1"/>
-              <a:t>Chunkurile</a:t>
-            </a:r>
-            <a:r>
-              <a:rPr lang="ro-RO" dirty="0"/>
-              <a:t> nu sunt distruse in </a:t>
-            </a:r>
-            <a:r>
-              <a:rPr lang="ro-RO" dirty="0" err="1"/>
-              <a:t>intregime</a:t>
-            </a:r>
-            <a:r>
-              <a:rPr lang="ro-RO" dirty="0"/>
-              <a:t> ci la dezactivare sunt salvate </a:t>
-            </a:r>
-            <a:r>
-              <a:rPr lang="ro-RO" dirty="0" err="1"/>
-              <a:t>intr</a:t>
-            </a:r>
-            <a:r>
-              <a:rPr lang="ro-RO" dirty="0"/>
-              <a:t>-un cache de unde vor fi </a:t>
-            </a:r>
-            <a:r>
-              <a:rPr lang="ro-RO" dirty="0" err="1"/>
-              <a:t>reincarcate</a:t>
-            </a:r>
-            <a:r>
-              <a:rPr lang="ro-RO" dirty="0"/>
-              <a:t> la comanda.</a:t>
-            </a:r>
-          </a:p>
-          <a:p>
-            <a:r>
-              <a:rPr lang="ro-RO" dirty="0"/>
-              <a:t>Fiecare </a:t>
-            </a:r>
-            <a:r>
-              <a:rPr lang="ro-RO" dirty="0" err="1"/>
-              <a:t>chunk</a:t>
-            </a:r>
-            <a:r>
-              <a:rPr lang="ro-RO" dirty="0"/>
-              <a:t> are un </a:t>
-            </a:r>
-            <a:r>
-              <a:rPr lang="ro-RO" dirty="0" err="1"/>
-              <a:t>mesh</a:t>
-            </a:r>
-            <a:r>
-              <a:rPr lang="ro-RO" dirty="0"/>
-              <a:t> atribuit si un </a:t>
-            </a:r>
-            <a:r>
-              <a:rPr lang="ro-RO" dirty="0" err="1"/>
-              <a:t>collider</a:t>
-            </a:r>
-            <a:r>
-              <a:rPr lang="ro-RO" dirty="0"/>
-              <a:t> format din acel </a:t>
-            </a:r>
-            <a:r>
-              <a:rPr lang="ro-RO" dirty="0" err="1"/>
-              <a:t>mesh</a:t>
-            </a:r>
-            <a:r>
-              <a:rPr lang="ro-RO" dirty="0"/>
-              <a:t>. Astfel vehiculul poate </a:t>
-            </a:r>
-            <a:r>
-              <a:rPr lang="ro-RO" dirty="0" err="1"/>
-              <a:t>interactiona</a:t>
-            </a:r>
-            <a:r>
-              <a:rPr lang="ro-RO" dirty="0"/>
-              <a:t> cu „</a:t>
-            </a:r>
-            <a:r>
-              <a:rPr lang="ro-RO" dirty="0" err="1"/>
-              <a:t>pamantul</a:t>
-            </a:r>
-            <a:r>
-              <a:rPr lang="ro-RO" dirty="0"/>
-              <a:t>”</a:t>
-            </a:r>
-          </a:p>
-        </p:txBody>
-      </p:sp>
+          <p:cNvPicPr>
+            <a:picLocks noChangeAspect="1"/>
+          </p:cNvPicPr>
+          <p:nvPr/>
+        </p:nvPicPr>
+        <p:blipFill>
+          <a:blip r:embed="rId3"/>
+          <a:stretch>
+            <a:fillRect/>
+          </a:stretch>
+        </p:blipFill>
+        <p:spPr>
+          <a:xfrm>
+            <a:off x="6657251" y="1195074"/>
+            <a:ext cx="5353797" cy="4467849"/>
+          </a:xfrm>
+          <a:prstGeom prst="roundRect">
+            <a:avLst>
+              <a:gd name="adj" fmla="val 8594"/>
+            </a:avLst>
+          </a:prstGeom>
+          <a:solidFill>
+            <a:srgbClr val="FFFFFF">
+              <a:shade val="85000"/>
+            </a:srgbClr>
+          </a:solidFill>
+          <a:ln>
+            <a:noFill/>
+          </a:ln>
+          <a:effectLst>
+            <a:reflection blurRad="12700" stA="38000" endPos="28000" dist="5000" dir="5400000" sy="-100000" algn="bl" rotWithShape="0"/>
+          </a:effectLst>
+        </p:spPr>
+      </p:pic>
     </p:spTree>
     <p:extLst>
       <p:ext uri="{BB962C8B-B14F-4D97-AF65-F5344CB8AC3E}">
-        <p14:creationId xmlns:p14="http://schemas.microsoft.com/office/powerpoint/2010/main" val="3430766955"/>
+        <p14:creationId xmlns:p14="http://schemas.microsoft.com/office/powerpoint/2010/main" val="1293764361"/>
       </p:ext>
     </p:extLst>
   </p:cSld>

</xml_diff>

<commit_message>
Fixed typo in presentation; Modified refraction
</commit_message>
<xml_diff>
--- a/Prezentare/OceanExploration.pptx
+++ b/Prezentare/OceanExploration.pptx
@@ -241,7 +241,7 @@
           <a:p>
             <a:fld id="{866D81A9-CFC2-4640-899E-DD3E177BE50A}" type="datetimeFigureOut">
               <a:rPr lang="en-US" smtClean="0"/>
-              <a:t>4/25/2022</a:t>
+              <a:t>5/13/2022</a:t>
             </a:fld>
             <a:endParaRPr lang="en-US" dirty="0"/>
           </a:p>
@@ -418,7 +418,7 @@
           <a:p>
             <a:fld id="{AA1E50F4-C55A-473A-A70B-4B042EF011A9}" type="datetimeFigureOut">
               <a:rPr lang="en-US" smtClean="0"/>
-              <a:t>4/25/2022</a:t>
+              <a:t>5/13/2022</a:t>
             </a:fld>
             <a:endParaRPr lang="en-US" dirty="0"/>
           </a:p>
@@ -1167,7 +1167,7 @@
             <a:fld id="{87DE6118-2437-4B30-8E3C-4D2BE6020583}" type="datetimeFigureOut">
               <a:rPr lang="en-US" smtClean="0"/>
               <a:pPr/>
-              <a:t>4/25/2022</a:t>
+              <a:t>5/13/2022</a:t>
             </a:fld>
             <a:endParaRPr lang="en-US" dirty="0"/>
           </a:p>
@@ -1503,7 +1503,7 @@
             <a:fld id="{87DE6118-2437-4B30-8E3C-4D2BE6020583}" type="datetimeFigureOut">
               <a:rPr lang="en-US" smtClean="0"/>
               <a:pPr/>
-              <a:t>4/25/2022</a:t>
+              <a:t>5/13/2022</a:t>
             </a:fld>
             <a:endParaRPr lang="en-US" dirty="0"/>
           </a:p>
@@ -1783,7 +1783,7 @@
             <a:fld id="{87DE6118-2437-4B30-8E3C-4D2BE6020583}" type="datetimeFigureOut">
               <a:rPr lang="en-US" smtClean="0"/>
               <a:pPr/>
-              <a:t>4/25/2022</a:t>
+              <a:t>5/13/2022</a:t>
             </a:fld>
             <a:endParaRPr lang="en-US" dirty="0"/>
           </a:p>
@@ -2353,7 +2353,7 @@
             <a:fld id="{87DE6118-2437-4B30-8E3C-4D2BE6020583}" type="datetimeFigureOut">
               <a:rPr lang="en-US" smtClean="0"/>
               <a:pPr/>
-              <a:t>4/25/2022</a:t>
+              <a:t>5/13/2022</a:t>
             </a:fld>
             <a:endParaRPr lang="en-US" dirty="0"/>
           </a:p>
@@ -2633,7 +2633,7 @@
             <a:fld id="{87DE6118-2437-4B30-8E3C-4D2BE6020583}" type="datetimeFigureOut">
               <a:rPr lang="en-US" smtClean="0"/>
               <a:pPr/>
-              <a:t>4/25/2022</a:t>
+              <a:t>5/13/2022</a:t>
             </a:fld>
             <a:endParaRPr lang="en-US" dirty="0"/>
           </a:p>
@@ -3197,7 +3197,7 @@
             <a:fld id="{87DE6118-2437-4B30-8E3C-4D2BE6020583}" type="datetimeFigureOut">
               <a:rPr lang="en-US" smtClean="0"/>
               <a:pPr/>
-              <a:t>4/25/2022</a:t>
+              <a:t>5/13/2022</a:t>
             </a:fld>
             <a:endParaRPr lang="en-US" dirty="0"/>
           </a:p>
@@ -3526,7 +3526,7 @@
             <a:fld id="{87DE6118-2437-4B30-8E3C-4D2BE6020583}" type="datetimeFigureOut">
               <a:rPr lang="en-US" smtClean="0"/>
               <a:pPr/>
-              <a:t>4/25/2022</a:t>
+              <a:t>5/13/2022</a:t>
             </a:fld>
             <a:endParaRPr lang="en-US" dirty="0"/>
           </a:p>
@@ -3732,7 +3732,7 @@
           <a:p>
             <a:fld id="{87DE6118-2437-4B30-8E3C-4D2BE6020583}" type="datetimeFigureOut">
               <a:rPr lang="en-US" smtClean="0"/>
-              <a:t>4/25/2022</a:t>
+              <a:t>5/13/2022</a:t>
             </a:fld>
             <a:endParaRPr lang="en-US" dirty="0"/>
           </a:p>
@@ -3942,7 +3942,7 @@
           <a:p>
             <a:fld id="{87DE6118-2437-4B30-8E3C-4D2BE6020583}" type="datetimeFigureOut">
               <a:rPr lang="en-US" smtClean="0"/>
-              <a:t>4/25/2022</a:t>
+              <a:t>5/13/2022</a:t>
             </a:fld>
             <a:endParaRPr lang="en-US" dirty="0"/>
           </a:p>
@@ -4142,7 +4142,7 @@
           <a:p>
             <a:fld id="{87DE6118-2437-4B30-8E3C-4D2BE6020583}" type="datetimeFigureOut">
               <a:rPr lang="en-US" smtClean="0"/>
-              <a:t>4/25/2022</a:t>
+              <a:t>5/13/2022</a:t>
             </a:fld>
             <a:endParaRPr lang="en-US" dirty="0"/>
           </a:p>
@@ -4419,7 +4419,7 @@
             <a:fld id="{87DE6118-2437-4B30-8E3C-4D2BE6020583}" type="datetimeFigureOut">
               <a:rPr lang="en-US" smtClean="0"/>
               <a:pPr/>
-              <a:t>4/25/2022</a:t>
+              <a:t>5/13/2022</a:t>
             </a:fld>
             <a:endParaRPr lang="en-US" dirty="0"/>
           </a:p>
@@ -4686,7 +4686,7 @@
           <a:p>
             <a:fld id="{87DE6118-2437-4B30-8E3C-4D2BE6020583}" type="datetimeFigureOut">
               <a:rPr lang="en-US" smtClean="0"/>
-              <a:t>4/25/2022</a:t>
+              <a:t>5/13/2022</a:t>
             </a:fld>
             <a:endParaRPr lang="en-US" dirty="0"/>
           </a:p>
@@ -5060,7 +5060,7 @@
           <a:p>
             <a:fld id="{87DE6118-2437-4B30-8E3C-4D2BE6020583}" type="datetimeFigureOut">
               <a:rPr lang="en-US" smtClean="0"/>
-              <a:t>4/25/2022</a:t>
+              <a:t>5/13/2022</a:t>
             </a:fld>
             <a:endParaRPr lang="en-US" dirty="0"/>
           </a:p>
@@ -5208,7 +5208,7 @@
           <a:p>
             <a:fld id="{87DE6118-2437-4B30-8E3C-4D2BE6020583}" type="datetimeFigureOut">
               <a:rPr lang="en-US" smtClean="0"/>
-              <a:t>4/25/2022</a:t>
+              <a:t>5/13/2022</a:t>
             </a:fld>
             <a:endParaRPr lang="en-US" dirty="0"/>
           </a:p>
@@ -5333,7 +5333,7 @@
           <a:p>
             <a:fld id="{87DE6118-2437-4B30-8E3C-4D2BE6020583}" type="datetimeFigureOut">
               <a:rPr lang="en-US" smtClean="0"/>
-              <a:t>4/25/2022</a:t>
+              <a:t>5/13/2022</a:t>
             </a:fld>
             <a:endParaRPr lang="en-US" dirty="0"/>
           </a:p>
@@ -5619,7 +5619,7 @@
             <a:fld id="{87DE6118-2437-4B30-8E3C-4D2BE6020583}" type="datetimeFigureOut">
               <a:rPr lang="en-US" smtClean="0"/>
               <a:pPr/>
-              <a:t>4/25/2022</a:t>
+              <a:t>5/13/2022</a:t>
             </a:fld>
             <a:endParaRPr lang="en-US" dirty="0"/>
           </a:p>
@@ -5945,7 +5945,7 @@
             <a:fld id="{87DE6118-2437-4B30-8E3C-4D2BE6020583}" type="datetimeFigureOut">
               <a:rPr lang="en-US" smtClean="0"/>
               <a:pPr/>
-              <a:t>4/25/2022</a:t>
+              <a:t>5/13/2022</a:t>
             </a:fld>
             <a:endParaRPr lang="en-US" dirty="0"/>
           </a:p>
@@ -6161,7 +6161,7 @@
             <a:fld id="{87DE6118-2437-4B30-8E3C-4D2BE6020583}" type="datetimeFigureOut">
               <a:rPr lang="en-US" smtClean="0"/>
               <a:pPr/>
-              <a:t>4/25/2022</a:t>
+              <a:t>5/13/2022</a:t>
             </a:fld>
             <a:endParaRPr lang="en-US" dirty="0"/>
           </a:p>
@@ -19670,8 +19670,8 @@
           </a:p>
         </p:txBody>
       </p:sp>
-      <mc:AlternateContent xmlns:mc="http://schemas.openxmlformats.org/markup-compatibility/2006" xmlns:a14="http://schemas.microsoft.com/office/drawing/2010/main">
-        <mc:Choice Requires="a14">
+      <mc:AlternateContent xmlns:mc="http://schemas.openxmlformats.org/markup-compatibility/2006">
+        <mc:Choice xmlns:a14="http://schemas.microsoft.com/office/drawing/2010/main" Requires="a14">
           <p:sp>
             <p:nvSpPr>
               <p:cNvPr id="3" name="Content Placeholder 2">
@@ -19794,7 +19794,7 @@
                 </a:r>
                 <a:r>
                   <a:rPr lang="ro-RO" dirty="0"/>
-                  <a:t> cat mai mult planta si pentru a prevenii ca toata </a:t>
+                  <a:t> cat mai mult planta si pentru a preveni ca toata </a:t>
                 </a:r>
                 <a:r>
                   <a:rPr lang="ro-RO" dirty="0" err="1"/>
@@ -19821,6 +19821,14 @@
                 <a:r>
                   <a:rPr lang="ro-RO" dirty="0" err="1"/>
                   <a:t>branchuri</a:t>
+                </a:r>
+                <a:r>
+                  <a:rPr lang="en-US" dirty="0"/>
+                  <a:t> </a:t>
+                </a:r>
+                <a:r>
+                  <a:rPr lang="en-US" dirty="0" err="1"/>
+                  <a:t>noi</a:t>
                 </a:r>
                 <a:r>
                   <a:rPr lang="ro-RO" dirty="0"/>
@@ -20003,7 +20011,7 @@
             </p:txBody>
           </p:sp>
         </mc:Choice>
-        <mc:Fallback xmlns="">
+        <mc:Fallback>
           <p:sp>
             <p:nvSpPr>
               <p:cNvPr id="3" name="Content Placeholder 2">
@@ -22620,12 +22628,12 @@
 </file>
 
 <file path=customXml/item1.xml><?xml version="1.0" encoding="utf-8"?>
-<?mso-contentType ?>
-<FormTemplates xmlns="http://schemas.microsoft.com/sharepoint/v3/contenttype/forms">
-  <Display>DocumentLibraryForm</Display>
-  <Edit>DocumentLibraryForm</Edit>
-  <New>DocumentLibraryForm</New>
-</FormTemplates>
+<p:properties xmlns:p="http://schemas.microsoft.com/office/2006/metadata/properties" xmlns:xsi="http://www.w3.org/2001/XMLSchema-instance" xmlns:pc="http://schemas.microsoft.com/office/infopath/2007/PartnerControls">
+  <documentManagement>
+    <MediaServiceKeyPoints xmlns="71af3243-3dd4-4a8d-8c0d-dd76da1f02a5" xsi:nil="true"/>
+    <Status xmlns="71af3243-3dd4-4a8d-8c0d-dd76da1f02a5">Not started</Status>
+  </documentManagement>
+</p:properties>
 </file>
 
 <file path=customXml/item2.xml><?xml version="1.0" encoding="utf-8"?>
@@ -22850,18 +22858,27 @@
 </file>
 
 <file path=customXml/item3.xml><?xml version="1.0" encoding="utf-8"?>
-<p:properties xmlns:p="http://schemas.microsoft.com/office/2006/metadata/properties" xmlns:xsi="http://www.w3.org/2001/XMLSchema-instance" xmlns:pc="http://schemas.microsoft.com/office/infopath/2007/PartnerControls">
-  <documentManagement>
-    <MediaServiceKeyPoints xmlns="71af3243-3dd4-4a8d-8c0d-dd76da1f02a5" xsi:nil="true"/>
-    <Status xmlns="71af3243-3dd4-4a8d-8c0d-dd76da1f02a5">Not started</Status>
-  </documentManagement>
-</p:properties>
+<?mso-contentType ?>
+<FormTemplates xmlns="http://schemas.microsoft.com/sharepoint/v3/contenttype/forms">
+  <Display>DocumentLibraryForm</Display>
+  <Edit>DocumentLibraryForm</Edit>
+  <New>DocumentLibraryForm</New>
+</FormTemplates>
 </file>
 
 <file path=customXml/itemProps1.xml><?xml version="1.0" encoding="utf-8"?>
-<ds:datastoreItem xmlns:ds="http://schemas.openxmlformats.org/officeDocument/2006/customXml" ds:itemID="{CE12C2FA-3740-4055-BA8A-74A1458F4A51}">
+<ds:datastoreItem xmlns:ds="http://schemas.openxmlformats.org/officeDocument/2006/customXml" ds:itemID="{4415B3C4-7FB6-414C-8C24-8862C0E6C9F3}">
   <ds:schemaRefs>
-    <ds:schemaRef ds:uri="http://schemas.microsoft.com/sharepoint/v3/contenttype/forms"/>
+    <ds:schemaRef ds:uri="http://www.w3.org/XML/1998/namespace"/>
+    <ds:schemaRef ds:uri="http://purl.org/dc/elements/1.1/"/>
+    <ds:schemaRef ds:uri="http://schemas.microsoft.com/office/infopath/2007/PartnerControls"/>
+    <ds:schemaRef ds:uri="http://purl.org/dc/dcmitype/"/>
+    <ds:schemaRef ds:uri="16c05727-aa75-4e4a-9b5f-8a80a1165891"/>
+    <ds:schemaRef ds:uri="http://schemas.microsoft.com/office/2006/documentManagement/types"/>
+    <ds:schemaRef ds:uri="71af3243-3dd4-4a8d-8c0d-dd76da1f02a5"/>
+    <ds:schemaRef ds:uri="http://schemas.openxmlformats.org/package/2006/metadata/core-properties"/>
+    <ds:schemaRef ds:uri="http://schemas.microsoft.com/office/2006/metadata/properties"/>
+    <ds:schemaRef ds:uri="http://purl.org/dc/terms/"/>
   </ds:schemaRefs>
 </ds:datastoreItem>
 </file>
@@ -22886,18 +22903,9 @@
 </file>
 
 <file path=customXml/itemProps3.xml><?xml version="1.0" encoding="utf-8"?>
-<ds:datastoreItem xmlns:ds="http://schemas.openxmlformats.org/officeDocument/2006/customXml" ds:itemID="{4415B3C4-7FB6-414C-8C24-8862C0E6C9F3}">
+<ds:datastoreItem xmlns:ds="http://schemas.openxmlformats.org/officeDocument/2006/customXml" ds:itemID="{CE12C2FA-3740-4055-BA8A-74A1458F4A51}">
   <ds:schemaRefs>
-    <ds:schemaRef ds:uri="http://www.w3.org/XML/1998/namespace"/>
-    <ds:schemaRef ds:uri="http://purl.org/dc/elements/1.1/"/>
-    <ds:schemaRef ds:uri="http://schemas.microsoft.com/office/infopath/2007/PartnerControls"/>
-    <ds:schemaRef ds:uri="http://purl.org/dc/dcmitype/"/>
-    <ds:schemaRef ds:uri="16c05727-aa75-4e4a-9b5f-8a80a1165891"/>
-    <ds:schemaRef ds:uri="http://schemas.microsoft.com/office/2006/documentManagement/types"/>
-    <ds:schemaRef ds:uri="71af3243-3dd4-4a8d-8c0d-dd76da1f02a5"/>
-    <ds:schemaRef ds:uri="http://schemas.openxmlformats.org/package/2006/metadata/core-properties"/>
-    <ds:schemaRef ds:uri="http://schemas.microsoft.com/office/2006/metadata/properties"/>
-    <ds:schemaRef ds:uri="http://purl.org/dc/terms/"/>
+    <ds:schemaRef ds:uri="http://schemas.microsoft.com/sharepoint/v3/contenttype/forms"/>
   </ds:schemaRefs>
 </ds:datastoreItem>
 </file>
</xml_diff>